<commit_message>
Modifica presentazione e piccole modifiche al codice
</commit_message>
<xml_diff>
--- a/Presentazione/presentazione.pptx
+++ b/Presentazione/presentazione.pptx
@@ -5,10 +5,10 @@
     <p:sldMasterId id="2147483696" r:id="rId4"/>
   </p:sldMasterIdLst>
   <p:notesMasterIdLst>
-    <p:notesMasterId r:id="rId19"/>
+    <p:notesMasterId r:id="rId24"/>
   </p:notesMasterIdLst>
   <p:handoutMasterIdLst>
-    <p:handoutMasterId r:id="rId20"/>
+    <p:handoutMasterId r:id="rId25"/>
   </p:handoutMasterIdLst>
   <p:sldIdLst>
     <p:sldId id="306" r:id="rId5"/>
@@ -25,6 +25,11 @@
     <p:sldId id="327" r:id="rId16"/>
     <p:sldId id="328" r:id="rId17"/>
     <p:sldId id="329" r:id="rId18"/>
+    <p:sldId id="330" r:id="rId19"/>
+    <p:sldId id="331" r:id="rId20"/>
+    <p:sldId id="333" r:id="rId21"/>
+    <p:sldId id="334" r:id="rId22"/>
+    <p:sldId id="332" r:id="rId23"/>
   </p:sldIdLst>
   <p:sldSz cx="12192000" cy="6858000"/>
   <p:notesSz cx="6858000" cy="9144000"/>
@@ -250,7 +255,7 @@
           <a:p>
             <a:fld id="{73EDD7B2-2DB1-4292-9CED-B6D9BDCC5040}" type="datetime1">
               <a:rPr lang="it-IT" smtClean="0"/>
-              <a:t>07/06/2021</a:t>
+              <a:t>09/06/2021</a:t>
             </a:fld>
             <a:endParaRPr lang="it-IT" dirty="0"/>
           </a:p>
@@ -430,7 +435,7 @@
             <a:fld id="{456F714F-066B-41A5-A6BD-50516EB8C346}" type="datetime1">
               <a:rPr lang="it-IT" smtClean="0"/>
               <a:pPr/>
-              <a:t>07/06/2021</a:t>
+              <a:t>09/06/2021</a:t>
             </a:fld>
             <a:endParaRPr lang="it-IT" dirty="0"/>
           </a:p>
@@ -11729,8 +11734,8 @@
         </p:blipFill>
         <p:spPr>
           <a:xfrm>
-            <a:off x="370754" y="1864927"/>
-            <a:ext cx="5528735" cy="4146551"/>
+            <a:off x="356400" y="1875600"/>
+            <a:ext cx="5486400" cy="4114800"/>
           </a:xfrm>
         </p:spPr>
       </p:pic>
@@ -11756,8 +11761,8 @@
         </p:blipFill>
         <p:spPr>
           <a:xfrm>
-            <a:off x="6292511" y="1864926"/>
-            <a:ext cx="5528735" cy="4146551"/>
+            <a:off x="6310800" y="1875600"/>
+            <a:ext cx="5486400" cy="4114800"/>
           </a:xfrm>
           <a:prstGeom prst="rect">
             <a:avLst/>
@@ -11853,6 +11858,18 @@
             <a:normAutofit/>
           </a:bodyPr>
           <a:lstStyle/>
+          <a:p>
+            <a:pPr>
+              <a:lnSpc>
+                <a:spcPct val="100000"/>
+              </a:lnSpc>
+            </a:pPr>
+            <a:endParaRPr lang="en-US" sz="2600" dirty="0">
+              <a:solidFill>
+                <a:schemeClr val="tx1"/>
+              </a:solidFill>
+            </a:endParaRPr>
+          </a:p>
           <a:p>
             <a:pPr>
               <a:lnSpc>
@@ -11998,8 +12015,8 @@
         </p:blipFill>
         <p:spPr>
           <a:xfrm>
-            <a:off x="372972" y="1690688"/>
-            <a:ext cx="5564532" cy="4351338"/>
+            <a:off x="356400" y="1875600"/>
+            <a:ext cx="5486400" cy="4114800"/>
           </a:xfrm>
         </p:spPr>
       </p:pic>
@@ -12025,8 +12042,8 @@
         </p:blipFill>
         <p:spPr>
           <a:xfrm>
-            <a:off x="6408828" y="1690688"/>
-            <a:ext cx="5410200" cy="4351338"/>
+            <a:off x="6310800" y="1875600"/>
+            <a:ext cx="5486400" cy="4114800"/>
           </a:xfrm>
           <a:prstGeom prst="rect">
             <a:avLst/>
@@ -12126,8 +12143,8 @@
         </p:blipFill>
         <p:spPr>
           <a:xfrm>
-            <a:off x="476251" y="1863724"/>
-            <a:ext cx="5306484" cy="3979863"/>
+            <a:off x="356400" y="1875600"/>
+            <a:ext cx="5486400" cy="4114800"/>
           </a:xfrm>
         </p:spPr>
       </p:pic>
@@ -12153,8 +12170,8 @@
         </p:blipFill>
         <p:spPr>
           <a:xfrm>
-            <a:off x="6409266" y="1863725"/>
-            <a:ext cx="5306484" cy="3979863"/>
+            <a:off x="6310800" y="1875599"/>
+            <a:ext cx="5486400" cy="4114800"/>
           </a:xfrm>
           <a:prstGeom prst="rect">
             <a:avLst/>
@@ -12236,487 +12253,1942 @@
           </a:p>
         </p:txBody>
       </p:sp>
-      <mc:AlternateContent xmlns:mc="http://schemas.openxmlformats.org/markup-compatibility/2006">
-        <mc:Choice xmlns:a14="http://schemas.microsoft.com/office/drawing/2010/main" Requires="a14">
-          <p:sp>
-            <p:nvSpPr>
-              <p:cNvPr id="3" name="Segnaposto contenuto 2">
-                <a:extLst>
-                  <a:ext uri="{FF2B5EF4-FFF2-40B4-BE49-F238E27FC236}">
-                    <a16:creationId xmlns:a16="http://schemas.microsoft.com/office/drawing/2014/main" id="{03F1FE39-20CD-49DD-9C63-BBB9CB6E564F}"/>
-                  </a:ext>
-                </a:extLst>
-              </p:cNvPr>
-              <p:cNvSpPr>
-                <a:spLocks noGrp="1"/>
-              </p:cNvSpPr>
-              <p:nvPr>
-                <p:ph idx="1"/>
-              </p:nvPr>
-            </p:nvSpPr>
-            <p:spPr/>
-            <p:txBody>
-              <a:bodyPr>
-                <a:normAutofit fontScale="92500"/>
-              </a:bodyPr>
-              <a:lstStyle/>
-              <a:p>
-                <a:pPr>
-                  <a:lnSpc>
-                    <a:spcPct val="100000"/>
-                  </a:lnSpc>
-                </a:pPr>
-                <a:r>
-                  <a:rPr lang="en-US" sz="2600" dirty="0">
-                    <a:solidFill>
-                      <a:schemeClr val="tx1"/>
-                    </a:solidFill>
-                  </a:rPr>
-                  <a:t>A general matrix can be transformed into a band matrix by performing permutations of rows and columns.</a:t>
-                </a:r>
-              </a:p>
-              <a:p>
-                <a:pPr>
-                  <a:lnSpc>
-                    <a:spcPct val="100000"/>
-                  </a:lnSpc>
-                </a:pPr>
-                <a:r>
-                  <a:rPr lang="en-US" sz="2600" dirty="0">
-                    <a:solidFill>
-                      <a:schemeClr val="tx1"/>
-                    </a:solidFill>
-                  </a:rPr>
-                  <a:t>The computational complexity of the RCM algorithm is </a:t>
-                </a:r>
-                <a14:m>
-                  <m:oMath xmlns:m="http://schemas.openxmlformats.org/officeDocument/2006/math">
-                    <m:r>
-                      <a:rPr lang="it-IT" sz="2600" b="0" i="1" smtClean="0">
-                        <a:solidFill>
-                          <a:schemeClr val="tx1"/>
-                        </a:solidFill>
-                        <a:latin typeface="Cambria Math" panose="02040503050406030204" pitchFamily="18" charset="0"/>
-                      </a:rPr>
-                      <m:t>𝑂</m:t>
-                    </m:r>
-                    <m:r>
-                      <a:rPr lang="it-IT" sz="2600" b="0" i="1" smtClean="0">
-                        <a:solidFill>
-                          <a:schemeClr val="tx1"/>
-                        </a:solidFill>
-                        <a:latin typeface="Cambria Math" panose="02040503050406030204" pitchFamily="18" charset="0"/>
-                      </a:rPr>
-                      <m:t>(</m:t>
-                    </m:r>
-                    <m:d>
-                      <m:dPr>
-                        <m:begChr m:val="|"/>
-                        <m:endChr m:val="|"/>
-                        <m:ctrlPr>
-                          <a:rPr lang="it-IT" sz="2600" b="0" i="1" smtClean="0">
-                            <a:solidFill>
-                              <a:schemeClr val="tx1"/>
-                            </a:solidFill>
-                            <a:latin typeface="Cambria Math" panose="02040503050406030204" pitchFamily="18" charset="0"/>
-                          </a:rPr>
-                        </m:ctrlPr>
-                      </m:dPr>
-                      <m:e>
-                        <m:r>
-                          <a:rPr lang="it-IT" sz="2600" b="0" i="1" smtClean="0">
-                            <a:solidFill>
-                              <a:schemeClr val="tx1"/>
-                            </a:solidFill>
-                            <a:latin typeface="Cambria Math" panose="02040503050406030204" pitchFamily="18" charset="0"/>
-                          </a:rPr>
-                          <m:t>𝑉</m:t>
-                        </m:r>
-                      </m:e>
-                    </m:d>
-                    <m:r>
-                      <a:rPr lang="it-IT" sz="2600" b="0" i="1" smtClean="0">
-                        <a:solidFill>
-                          <a:schemeClr val="tx1"/>
-                        </a:solidFill>
-                        <a:latin typeface="Cambria Math" panose="02040503050406030204" pitchFamily="18" charset="0"/>
-                      </a:rPr>
-                      <m:t>𝐷</m:t>
-                    </m:r>
-                    <m:r>
-                      <a:rPr lang="it-IT" sz="2600" b="0" i="1" smtClean="0">
-                        <a:solidFill>
-                          <a:schemeClr val="tx1"/>
-                        </a:solidFill>
-                        <a:latin typeface="Cambria Math" panose="02040503050406030204" pitchFamily="18" charset="0"/>
-                      </a:rPr>
-                      <m:t> </m:t>
-                    </m:r>
-                    <m:r>
-                      <a:rPr lang="it-IT" sz="2600" b="0" i="1" smtClean="0">
-                        <a:solidFill>
-                          <a:schemeClr val="tx1"/>
-                        </a:solidFill>
-                        <a:latin typeface="Cambria Math" panose="02040503050406030204" pitchFamily="18" charset="0"/>
-                      </a:rPr>
-                      <m:t>𝑙𝑜𝑔𝐷</m:t>
-                    </m:r>
-                    <m:r>
-                      <a:rPr lang="it-IT" sz="2600" b="0" i="1" smtClean="0">
-                        <a:solidFill>
-                          <a:schemeClr val="tx1"/>
-                        </a:solidFill>
-                        <a:latin typeface="Cambria Math" panose="02040503050406030204" pitchFamily="18" charset="0"/>
-                      </a:rPr>
-                      <m:t>)</m:t>
-                    </m:r>
-                  </m:oMath>
-                </a14:m>
-                <a:r>
-                  <a:rPr lang="en-US" sz="2600" dirty="0">
-                    <a:solidFill>
-                      <a:schemeClr val="tx1"/>
-                    </a:solidFill>
-                  </a:rPr>
-                  <a:t>, where D is the maximum degree of any vertex in the adjacency list.</a:t>
-                </a:r>
-                <a:endParaRPr lang="it-IT" sz="2600" dirty="0">
-                  <a:solidFill>
-                    <a:schemeClr val="tx1"/>
-                  </a:solidFill>
-                </a:endParaRPr>
-              </a:p>
-              <a:p>
-                <a:pPr marL="0" indent="0">
-                  <a:lnSpc>
-                    <a:spcPct val="100000"/>
-                  </a:lnSpc>
-                  <a:buNone/>
-                </a:pPr>
-                <a:endParaRPr lang="it-IT" sz="2600" dirty="0">
-                  <a:solidFill>
-                    <a:schemeClr val="tx1"/>
-                  </a:solidFill>
-                </a:endParaRPr>
-              </a:p>
-              <a:p>
-                <a:pPr>
-                  <a:lnSpc>
-                    <a:spcPct val="100000"/>
-                  </a:lnSpc>
-                </a:pPr>
-                <a:r>
-                  <a:rPr lang="it-IT" sz="2600" dirty="0">
-                    <a:solidFill>
-                      <a:schemeClr val="tx1"/>
-                    </a:solidFill>
-                  </a:rPr>
-                  <a:t>To </a:t>
-                </a:r>
-                <a:r>
-                  <a:rPr lang="it-IT" sz="2600" dirty="0" err="1">
-                    <a:solidFill>
-                      <a:schemeClr val="tx1"/>
-                    </a:solidFill>
-                  </a:rPr>
-                  <a:t>evaluate</a:t>
-                </a:r>
-                <a:r>
-                  <a:rPr lang="it-IT" sz="2600" dirty="0">
-                    <a:solidFill>
-                      <a:schemeClr val="tx1"/>
-                    </a:solidFill>
-                  </a:rPr>
-                  <a:t> the Reverse </a:t>
-                </a:r>
-                <a:r>
-                  <a:rPr lang="it-IT" sz="2600" dirty="0" err="1">
-                    <a:solidFill>
-                      <a:schemeClr val="tx1"/>
-                    </a:solidFill>
-                  </a:rPr>
-                  <a:t>Cuthill-McKee</a:t>
-                </a:r>
-                <a:r>
-                  <a:rPr lang="it-IT" sz="2600" dirty="0">
-                    <a:solidFill>
-                      <a:schemeClr val="tx1"/>
-                    </a:solidFill>
-                  </a:rPr>
-                  <a:t> </a:t>
-                </a:r>
-                <a:r>
-                  <a:rPr lang="it-IT" sz="2600" dirty="0" err="1">
-                    <a:solidFill>
-                      <a:schemeClr val="tx1"/>
-                    </a:solidFill>
-                  </a:rPr>
-                  <a:t>algorithm</a:t>
-                </a:r>
-                <a:r>
-                  <a:rPr lang="it-IT" sz="2600" dirty="0">
-                    <a:solidFill>
-                      <a:schemeClr val="tx1"/>
-                    </a:solidFill>
-                  </a:rPr>
-                  <a:t> that </a:t>
-                </a:r>
-                <a:r>
-                  <a:rPr lang="it-IT" sz="2600" dirty="0" err="1">
-                    <a:solidFill>
-                      <a:schemeClr val="tx1"/>
-                    </a:solidFill>
-                  </a:rPr>
-                  <a:t>we</a:t>
-                </a:r>
-                <a:r>
-                  <a:rPr lang="it-IT" sz="2600" dirty="0">
-                    <a:solidFill>
-                      <a:schemeClr val="tx1"/>
-                    </a:solidFill>
-                  </a:rPr>
-                  <a:t> have </a:t>
-                </a:r>
-                <a:r>
-                  <a:rPr lang="it-IT" sz="2600" dirty="0" err="1">
-                    <a:solidFill>
-                      <a:schemeClr val="tx1"/>
-                    </a:solidFill>
-                  </a:rPr>
-                  <a:t>implemented</a:t>
-                </a:r>
-                <a:r>
-                  <a:rPr lang="it-IT" sz="2600" dirty="0">
-                    <a:solidFill>
-                      <a:schemeClr val="tx1"/>
-                    </a:solidFill>
-                  </a:rPr>
-                  <a:t> to </a:t>
-                </a:r>
-                <a:r>
-                  <a:rPr lang="it-IT" sz="2600" dirty="0" err="1">
-                    <a:solidFill>
-                      <a:schemeClr val="tx1"/>
-                    </a:solidFill>
-                  </a:rPr>
-                  <a:t>simplify</a:t>
-                </a:r>
-                <a:r>
-                  <a:rPr lang="it-IT" sz="2600" dirty="0">
-                    <a:solidFill>
-                      <a:schemeClr val="tx1"/>
-                    </a:solidFill>
-                  </a:rPr>
-                  <a:t> the </a:t>
-                </a:r>
-                <a:r>
-                  <a:rPr lang="it-IT" sz="2600" dirty="0" err="1">
-                    <a:solidFill>
-                      <a:schemeClr val="tx1"/>
-                    </a:solidFill>
-                  </a:rPr>
-                  <a:t>grouping</a:t>
-                </a:r>
-                <a:r>
-                  <a:rPr lang="it-IT" sz="2600" dirty="0">
-                    <a:solidFill>
-                      <a:schemeClr val="tx1"/>
-                    </a:solidFill>
-                  </a:rPr>
-                  <a:t> </a:t>
-                </a:r>
-                <a:r>
-                  <a:rPr lang="it-IT" sz="2600" dirty="0" err="1">
-                    <a:solidFill>
-                      <a:schemeClr val="tx1"/>
-                    </a:solidFill>
-                  </a:rPr>
-                  <a:t>operations</a:t>
-                </a:r>
-                <a:r>
-                  <a:rPr lang="it-IT" sz="2600" dirty="0">
-                    <a:solidFill>
-                      <a:schemeClr val="tx1"/>
-                    </a:solidFill>
-                  </a:rPr>
-                  <a:t> </a:t>
-                </a:r>
-                <a:r>
-                  <a:rPr lang="it-IT" sz="2600" dirty="0" err="1">
-                    <a:solidFill>
-                      <a:schemeClr val="tx1"/>
-                    </a:solidFill>
-                  </a:rPr>
-                  <a:t>we</a:t>
-                </a:r>
-                <a:r>
-                  <a:rPr lang="it-IT" sz="2600" dirty="0">
-                    <a:solidFill>
-                      <a:schemeClr val="tx1"/>
-                    </a:solidFill>
-                  </a:rPr>
-                  <a:t> have </a:t>
-                </a:r>
-                <a:r>
-                  <a:rPr lang="it-IT" sz="2600" dirty="0" err="1">
-                    <a:solidFill>
-                      <a:schemeClr val="tx1"/>
-                    </a:solidFill>
-                  </a:rPr>
-                  <a:t>plotted</a:t>
-                </a:r>
-                <a:r>
-                  <a:rPr lang="it-IT" sz="2600" dirty="0">
-                    <a:solidFill>
-                      <a:schemeClr val="tx1"/>
-                    </a:solidFill>
-                  </a:rPr>
-                  <a:t> the </a:t>
-                </a:r>
-                <a:r>
-                  <a:rPr lang="it-IT" sz="2600" dirty="0" err="1">
-                    <a:solidFill>
-                      <a:schemeClr val="tx1"/>
-                    </a:solidFill>
-                  </a:rPr>
-                  <a:t>differences</a:t>
-                </a:r>
-                <a:r>
-                  <a:rPr lang="it-IT" sz="2600" dirty="0">
-                    <a:solidFill>
-                      <a:schemeClr val="tx1"/>
-                    </a:solidFill>
-                  </a:rPr>
-                  <a:t> in </a:t>
-                </a:r>
-                <a:r>
-                  <a:rPr lang="it-IT" sz="2600" dirty="0" err="1">
-                    <a:solidFill>
-                      <a:schemeClr val="tx1"/>
-                    </a:solidFill>
-                  </a:rPr>
-                  <a:t>terms</a:t>
-                </a:r>
-                <a:r>
-                  <a:rPr lang="it-IT" sz="2600" dirty="0">
-                    <a:solidFill>
-                      <a:schemeClr val="tx1"/>
-                    </a:solidFill>
-                  </a:rPr>
-                  <a:t> of </a:t>
-                </a:r>
-                <a:r>
-                  <a:rPr lang="it-IT" sz="2600" dirty="0" err="1">
-                    <a:solidFill>
-                      <a:schemeClr val="tx1"/>
-                    </a:solidFill>
-                  </a:rPr>
-                  <a:t>execution</a:t>
-                </a:r>
-                <a:r>
-                  <a:rPr lang="it-IT" sz="2600" dirty="0">
-                    <a:solidFill>
-                      <a:schemeClr val="tx1"/>
-                    </a:solidFill>
-                  </a:rPr>
-                  <a:t> time and </a:t>
-                </a:r>
-                <a:r>
-                  <a:rPr lang="it-IT" sz="2600" dirty="0" err="1">
-                    <a:solidFill>
-                      <a:schemeClr val="tx1"/>
-                    </a:solidFill>
-                  </a:rPr>
-                  <a:t>reconstruction</a:t>
-                </a:r>
-                <a:r>
-                  <a:rPr lang="it-IT" sz="2600" dirty="0">
-                    <a:solidFill>
-                      <a:schemeClr val="tx1"/>
-                    </a:solidFill>
-                  </a:rPr>
-                  <a:t> </a:t>
-                </a:r>
-                <a:r>
-                  <a:rPr lang="it-IT" sz="2600" dirty="0" err="1">
-                    <a:solidFill>
-                      <a:schemeClr val="tx1"/>
-                    </a:solidFill>
-                  </a:rPr>
-                  <a:t>error</a:t>
-                </a:r>
-                <a:r>
-                  <a:rPr lang="it-IT" sz="2600" dirty="0">
-                    <a:solidFill>
-                      <a:schemeClr val="tx1"/>
-                    </a:solidFill>
-                  </a:rPr>
-                  <a:t>.</a:t>
-                </a:r>
-              </a:p>
-              <a:p>
-                <a:pPr marL="0" indent="0">
-                  <a:lnSpc>
-                    <a:spcPct val="100000"/>
-                  </a:lnSpc>
-                  <a:buNone/>
-                </a:pPr>
-                <a:r>
-                  <a:rPr lang="it-IT" sz="2600" dirty="0">
-                    <a:solidFill>
-                      <a:schemeClr val="tx1"/>
-                    </a:solidFill>
-                  </a:rPr>
-                  <a:t> </a:t>
-                </a:r>
-              </a:p>
-            </p:txBody>
-          </p:sp>
-        </mc:Choice>
-        <mc:Fallback>
-          <p:sp>
-            <p:nvSpPr>
-              <p:cNvPr id="3" name="Segnaposto contenuto 2">
-                <a:extLst>
-                  <a:ext uri="{FF2B5EF4-FFF2-40B4-BE49-F238E27FC236}">
-                    <a16:creationId xmlns:a16="http://schemas.microsoft.com/office/drawing/2014/main" id="{03F1FE39-20CD-49DD-9C63-BBB9CB6E564F}"/>
-                  </a:ext>
-                </a:extLst>
-              </p:cNvPr>
-              <p:cNvSpPr>
-                <a:spLocks noGrp="1" noRot="1" noChangeAspect="1" noMove="1" noResize="1" noEditPoints="1" noAdjustHandles="1" noChangeArrowheads="1" noChangeShapeType="1" noTextEdit="1"/>
-              </p:cNvSpPr>
-              <p:nvPr>
-                <p:ph idx="1"/>
-              </p:nvPr>
-            </p:nvSpPr>
-            <p:spPr>
-              <a:blipFill>
-                <a:blip r:embed="rId2"/>
-                <a:stretch>
-                  <a:fillRect l="-792" t="-980"/>
-                </a:stretch>
-              </a:blipFill>
-            </p:spPr>
-            <p:txBody>
-              <a:bodyPr/>
-              <a:lstStyle/>
-              <a:p>
-                <a:r>
-                  <a:rPr lang="it-IT">
-                    <a:noFill/>
-                  </a:rPr>
-                  <a:t> </a:t>
-                </a:r>
-              </a:p>
-            </p:txBody>
-          </p:sp>
-        </mc:Fallback>
-      </mc:AlternateContent>
+      <p:sp>
+        <p:nvSpPr>
+          <p:cNvPr id="3" name="Segnaposto contenuto 2">
+            <a:extLst>
+              <a:ext uri="{FF2B5EF4-FFF2-40B4-BE49-F238E27FC236}">
+                <a16:creationId xmlns:a16="http://schemas.microsoft.com/office/drawing/2014/main" id="{03F1FE39-20CD-49DD-9C63-BBB9CB6E564F}"/>
+              </a:ext>
+            </a:extLst>
+          </p:cNvPr>
+          <p:cNvSpPr>
+            <a:spLocks noGrp="1"/>
+          </p:cNvSpPr>
+          <p:nvPr>
+            <p:ph idx="1"/>
+          </p:nvPr>
+        </p:nvSpPr>
+        <p:spPr/>
+        <p:txBody>
+          <a:bodyPr>
+            <a:normAutofit lnSpcReduction="10000"/>
+          </a:bodyPr>
+          <a:lstStyle/>
+          <a:p>
+            <a:pPr>
+              <a:lnSpc>
+                <a:spcPct val="100000"/>
+              </a:lnSpc>
+            </a:pPr>
+            <a:r>
+              <a:rPr lang="it-IT" sz="2600" dirty="0">
+                <a:solidFill>
+                  <a:schemeClr val="tx1"/>
+                </a:solidFill>
+              </a:rPr>
+              <a:t>To </a:t>
+            </a:r>
+            <a:r>
+              <a:rPr lang="it-IT" sz="2600" dirty="0" err="1">
+                <a:solidFill>
+                  <a:schemeClr val="tx1"/>
+                </a:solidFill>
+              </a:rPr>
+              <a:t>evaluate</a:t>
+            </a:r>
+            <a:r>
+              <a:rPr lang="it-IT" sz="2600" dirty="0">
+                <a:solidFill>
+                  <a:schemeClr val="tx1"/>
+                </a:solidFill>
+              </a:rPr>
+              <a:t> the Reverse </a:t>
+            </a:r>
+            <a:r>
+              <a:rPr lang="it-IT" sz="2600" dirty="0" err="1">
+                <a:solidFill>
+                  <a:schemeClr val="tx1"/>
+                </a:solidFill>
+              </a:rPr>
+              <a:t>Cuthill-McKee</a:t>
+            </a:r>
+            <a:r>
+              <a:rPr lang="it-IT" sz="2600" dirty="0">
+                <a:solidFill>
+                  <a:schemeClr val="tx1"/>
+                </a:solidFill>
+              </a:rPr>
+              <a:t> </a:t>
+            </a:r>
+            <a:r>
+              <a:rPr lang="it-IT" sz="2600" dirty="0" err="1">
+                <a:solidFill>
+                  <a:schemeClr val="tx1"/>
+                </a:solidFill>
+              </a:rPr>
+              <a:t>algorithm</a:t>
+            </a:r>
+            <a:r>
+              <a:rPr lang="it-IT" sz="2600" dirty="0">
+                <a:solidFill>
+                  <a:schemeClr val="tx1"/>
+                </a:solidFill>
+              </a:rPr>
+              <a:t> </a:t>
+            </a:r>
+            <a:r>
+              <a:rPr lang="it-IT" sz="2600" dirty="0" err="1">
+                <a:solidFill>
+                  <a:schemeClr val="tx1"/>
+                </a:solidFill>
+              </a:rPr>
+              <a:t>that</a:t>
+            </a:r>
+            <a:r>
+              <a:rPr lang="it-IT" sz="2600" dirty="0">
+                <a:solidFill>
+                  <a:schemeClr val="tx1"/>
+                </a:solidFill>
+              </a:rPr>
+              <a:t> </a:t>
+            </a:r>
+            <a:r>
+              <a:rPr lang="it-IT" sz="2600" dirty="0" err="1">
+                <a:solidFill>
+                  <a:schemeClr val="tx1"/>
+                </a:solidFill>
+              </a:rPr>
+              <a:t>we</a:t>
+            </a:r>
+            <a:r>
+              <a:rPr lang="it-IT" sz="2600" dirty="0">
+                <a:solidFill>
+                  <a:schemeClr val="tx1"/>
+                </a:solidFill>
+              </a:rPr>
+              <a:t> </a:t>
+            </a:r>
+            <a:r>
+              <a:rPr lang="it-IT" sz="2600" dirty="0" err="1">
+                <a:solidFill>
+                  <a:schemeClr val="tx1"/>
+                </a:solidFill>
+              </a:rPr>
+              <a:t>have</a:t>
+            </a:r>
+            <a:r>
+              <a:rPr lang="it-IT" sz="2600" dirty="0">
+                <a:solidFill>
+                  <a:schemeClr val="tx1"/>
+                </a:solidFill>
+              </a:rPr>
+              <a:t> </a:t>
+            </a:r>
+            <a:r>
+              <a:rPr lang="it-IT" sz="2600" dirty="0" err="1">
+                <a:solidFill>
+                  <a:schemeClr val="tx1"/>
+                </a:solidFill>
+              </a:rPr>
+              <a:t>implemented</a:t>
+            </a:r>
+            <a:r>
+              <a:rPr lang="it-IT" sz="2600" dirty="0">
+                <a:solidFill>
+                  <a:schemeClr val="tx1"/>
+                </a:solidFill>
+              </a:rPr>
+              <a:t> to </a:t>
+            </a:r>
+            <a:r>
+              <a:rPr lang="it-IT" sz="2600" dirty="0" err="1">
+                <a:solidFill>
+                  <a:schemeClr val="tx1"/>
+                </a:solidFill>
+              </a:rPr>
+              <a:t>simplify</a:t>
+            </a:r>
+            <a:r>
+              <a:rPr lang="it-IT" sz="2600" dirty="0">
+                <a:solidFill>
+                  <a:schemeClr val="tx1"/>
+                </a:solidFill>
+              </a:rPr>
+              <a:t> the </a:t>
+            </a:r>
+            <a:r>
+              <a:rPr lang="it-IT" sz="2600" dirty="0" err="1">
+                <a:solidFill>
+                  <a:schemeClr val="tx1"/>
+                </a:solidFill>
+              </a:rPr>
+              <a:t>grouping</a:t>
+            </a:r>
+            <a:r>
+              <a:rPr lang="it-IT" sz="2600" dirty="0">
+                <a:solidFill>
+                  <a:schemeClr val="tx1"/>
+                </a:solidFill>
+              </a:rPr>
+              <a:t> </a:t>
+            </a:r>
+            <a:r>
+              <a:rPr lang="it-IT" sz="2600" dirty="0" err="1">
+                <a:solidFill>
+                  <a:schemeClr val="tx1"/>
+                </a:solidFill>
+              </a:rPr>
+              <a:t>operations</a:t>
+            </a:r>
+            <a:r>
+              <a:rPr lang="it-IT" sz="2600" dirty="0">
+                <a:solidFill>
+                  <a:schemeClr val="tx1"/>
+                </a:solidFill>
+              </a:rPr>
+              <a:t> </a:t>
+            </a:r>
+            <a:r>
+              <a:rPr lang="it-IT" sz="2600" dirty="0" err="1">
+                <a:solidFill>
+                  <a:schemeClr val="tx1"/>
+                </a:solidFill>
+              </a:rPr>
+              <a:t>we</a:t>
+            </a:r>
+            <a:r>
+              <a:rPr lang="it-IT" sz="2600" dirty="0">
+                <a:solidFill>
+                  <a:schemeClr val="tx1"/>
+                </a:solidFill>
+              </a:rPr>
+              <a:t> </a:t>
+            </a:r>
+            <a:r>
+              <a:rPr lang="it-IT" sz="2600" dirty="0" err="1">
+                <a:solidFill>
+                  <a:schemeClr val="tx1"/>
+                </a:solidFill>
+              </a:rPr>
+              <a:t>have</a:t>
+            </a:r>
+            <a:r>
+              <a:rPr lang="it-IT" sz="2600" dirty="0">
+                <a:solidFill>
+                  <a:schemeClr val="tx1"/>
+                </a:solidFill>
+              </a:rPr>
+              <a:t> </a:t>
+            </a:r>
+            <a:r>
+              <a:rPr lang="it-IT" sz="2600" dirty="0" err="1">
+                <a:solidFill>
+                  <a:schemeClr val="tx1"/>
+                </a:solidFill>
+              </a:rPr>
+              <a:t>plotted</a:t>
+            </a:r>
+            <a:r>
+              <a:rPr lang="it-IT" sz="2600" dirty="0">
+                <a:solidFill>
+                  <a:schemeClr val="tx1"/>
+                </a:solidFill>
+              </a:rPr>
+              <a:t> the </a:t>
+            </a:r>
+            <a:r>
+              <a:rPr lang="it-IT" sz="2600" dirty="0" err="1">
+                <a:solidFill>
+                  <a:schemeClr val="tx1"/>
+                </a:solidFill>
+              </a:rPr>
+              <a:t>differences</a:t>
+            </a:r>
+            <a:r>
+              <a:rPr lang="it-IT" sz="2600" dirty="0">
+                <a:solidFill>
+                  <a:schemeClr val="tx1"/>
+                </a:solidFill>
+              </a:rPr>
+              <a:t> in </a:t>
+            </a:r>
+            <a:r>
+              <a:rPr lang="it-IT" sz="2600" dirty="0" err="1">
+                <a:solidFill>
+                  <a:schemeClr val="tx1"/>
+                </a:solidFill>
+              </a:rPr>
+              <a:t>terms</a:t>
+            </a:r>
+            <a:r>
+              <a:rPr lang="it-IT" sz="2600" dirty="0">
+                <a:solidFill>
+                  <a:schemeClr val="tx1"/>
+                </a:solidFill>
+              </a:rPr>
+              <a:t> of </a:t>
+            </a:r>
+            <a:r>
+              <a:rPr lang="it-IT" sz="2600" dirty="0" err="1">
+                <a:solidFill>
+                  <a:schemeClr val="tx1"/>
+                </a:solidFill>
+              </a:rPr>
+              <a:t>execution</a:t>
+            </a:r>
+            <a:r>
+              <a:rPr lang="it-IT" sz="2600" dirty="0">
+                <a:solidFill>
+                  <a:schemeClr val="tx1"/>
+                </a:solidFill>
+              </a:rPr>
+              <a:t> time and </a:t>
+            </a:r>
+            <a:r>
+              <a:rPr lang="it-IT" sz="2600" dirty="0" err="1">
+                <a:solidFill>
+                  <a:schemeClr val="tx1"/>
+                </a:solidFill>
+              </a:rPr>
+              <a:t>reconstruction</a:t>
+            </a:r>
+            <a:r>
+              <a:rPr lang="it-IT" sz="2600" dirty="0">
+                <a:solidFill>
+                  <a:schemeClr val="tx1"/>
+                </a:solidFill>
+              </a:rPr>
+              <a:t> </a:t>
+            </a:r>
+            <a:r>
+              <a:rPr lang="it-IT" sz="2600" dirty="0" err="1">
+                <a:solidFill>
+                  <a:schemeClr val="tx1"/>
+                </a:solidFill>
+              </a:rPr>
+              <a:t>error</a:t>
+            </a:r>
+            <a:r>
+              <a:rPr lang="it-IT" sz="2600" dirty="0">
+                <a:solidFill>
+                  <a:schemeClr val="tx1"/>
+                </a:solidFill>
+              </a:rPr>
+              <a:t> </a:t>
+            </a:r>
+            <a:r>
+              <a:rPr lang="it-IT" sz="2600" dirty="0" err="1">
+                <a:solidFill>
+                  <a:schemeClr val="tx1"/>
+                </a:solidFill>
+              </a:rPr>
+              <a:t>between</a:t>
+            </a:r>
+            <a:r>
+              <a:rPr lang="it-IT" sz="2600" dirty="0">
+                <a:solidFill>
+                  <a:schemeClr val="tx1"/>
+                </a:solidFill>
+              </a:rPr>
+              <a:t> the </a:t>
+            </a:r>
+            <a:r>
+              <a:rPr lang="it-IT" sz="2600" dirty="0" err="1">
+                <a:solidFill>
+                  <a:schemeClr val="tx1"/>
+                </a:solidFill>
+              </a:rPr>
+              <a:t>usage</a:t>
+            </a:r>
+            <a:r>
+              <a:rPr lang="it-IT" sz="2600" dirty="0">
+                <a:solidFill>
+                  <a:schemeClr val="tx1"/>
+                </a:solidFill>
+              </a:rPr>
+              <a:t> of RCM and </a:t>
+            </a:r>
+            <a:r>
+              <a:rPr lang="it-IT" sz="2600" dirty="0" err="1">
+                <a:solidFill>
+                  <a:schemeClr val="tx1"/>
+                </a:solidFill>
+              </a:rPr>
+              <a:t>without</a:t>
+            </a:r>
+            <a:r>
+              <a:rPr lang="it-IT" sz="2600" dirty="0">
+                <a:solidFill>
+                  <a:schemeClr val="tx1"/>
+                </a:solidFill>
+              </a:rPr>
+              <a:t> </a:t>
+            </a:r>
+            <a:r>
+              <a:rPr lang="it-IT" sz="2600" dirty="0" err="1">
+                <a:solidFill>
+                  <a:schemeClr val="tx1"/>
+                </a:solidFill>
+              </a:rPr>
+              <a:t>using</a:t>
+            </a:r>
+            <a:r>
+              <a:rPr lang="it-IT" sz="2600" dirty="0">
+                <a:solidFill>
+                  <a:schemeClr val="tx1"/>
+                </a:solidFill>
+              </a:rPr>
+              <a:t> </a:t>
+            </a:r>
+            <a:r>
+              <a:rPr lang="it-IT" sz="2600" dirty="0" err="1">
+                <a:solidFill>
+                  <a:schemeClr val="tx1"/>
+                </a:solidFill>
+              </a:rPr>
+              <a:t>it</a:t>
+            </a:r>
+            <a:r>
+              <a:rPr lang="it-IT" sz="2600" dirty="0">
+                <a:solidFill>
+                  <a:schemeClr val="tx1"/>
+                </a:solidFill>
+              </a:rPr>
+              <a:t>.</a:t>
+            </a:r>
+          </a:p>
+          <a:p>
+            <a:pPr>
+              <a:lnSpc>
+                <a:spcPct val="100000"/>
+              </a:lnSpc>
+            </a:pPr>
+            <a:r>
+              <a:rPr lang="it-IT" sz="2600" dirty="0">
+                <a:solidFill>
+                  <a:schemeClr val="tx1"/>
+                </a:solidFill>
+              </a:rPr>
+              <a:t>To </a:t>
+            </a:r>
+            <a:r>
+              <a:rPr lang="it-IT" sz="2600" dirty="0" err="1">
+                <a:solidFill>
+                  <a:schemeClr val="tx1"/>
+                </a:solidFill>
+              </a:rPr>
+              <a:t>have</a:t>
+            </a:r>
+            <a:r>
+              <a:rPr lang="it-IT" sz="2600" dirty="0">
+                <a:solidFill>
+                  <a:schemeClr val="tx1"/>
+                </a:solidFill>
+              </a:rPr>
+              <a:t> an idea on the impact on the </a:t>
+            </a:r>
+            <a:r>
+              <a:rPr lang="it-IT" sz="2600" dirty="0" err="1">
+                <a:solidFill>
+                  <a:schemeClr val="tx1"/>
+                </a:solidFill>
+              </a:rPr>
+              <a:t>resources</a:t>
+            </a:r>
+            <a:r>
+              <a:rPr lang="it-IT" sz="2600" dirty="0">
+                <a:solidFill>
+                  <a:schemeClr val="tx1"/>
+                </a:solidFill>
+              </a:rPr>
+              <a:t> of </a:t>
+            </a:r>
+            <a:r>
+              <a:rPr lang="it-IT" sz="2600" dirty="0" err="1">
+                <a:solidFill>
+                  <a:schemeClr val="tx1"/>
+                </a:solidFill>
+              </a:rPr>
+              <a:t>our</a:t>
+            </a:r>
+            <a:r>
+              <a:rPr lang="it-IT" sz="2600" dirty="0">
+                <a:solidFill>
+                  <a:schemeClr val="tx1"/>
+                </a:solidFill>
+              </a:rPr>
+              <a:t> </a:t>
+            </a:r>
+            <a:r>
+              <a:rPr lang="it-IT" sz="2600" dirty="0" err="1">
+                <a:solidFill>
+                  <a:schemeClr val="tx1"/>
+                </a:solidFill>
+              </a:rPr>
+              <a:t>implementation</a:t>
+            </a:r>
+            <a:r>
+              <a:rPr lang="it-IT" sz="2600" dirty="0">
+                <a:solidFill>
+                  <a:schemeClr val="tx1"/>
+                </a:solidFill>
+              </a:rPr>
+              <a:t> </a:t>
+            </a:r>
+            <a:r>
+              <a:rPr lang="it-IT" sz="2600" dirty="0" err="1">
+                <a:solidFill>
+                  <a:schemeClr val="tx1"/>
+                </a:solidFill>
+              </a:rPr>
+              <a:t>we</a:t>
+            </a:r>
+            <a:r>
+              <a:rPr lang="it-IT" sz="2600" dirty="0">
+                <a:solidFill>
+                  <a:schemeClr val="tx1"/>
+                </a:solidFill>
+              </a:rPr>
+              <a:t> </a:t>
+            </a:r>
+            <a:r>
+              <a:rPr lang="it-IT" sz="2600" dirty="0" err="1">
+                <a:solidFill>
+                  <a:schemeClr val="tx1"/>
+                </a:solidFill>
+              </a:rPr>
+              <a:t>have</a:t>
+            </a:r>
+            <a:r>
+              <a:rPr lang="it-IT" sz="2600" dirty="0">
+                <a:solidFill>
+                  <a:schemeClr val="tx1"/>
+                </a:solidFill>
+              </a:rPr>
+              <a:t> </a:t>
+            </a:r>
+            <a:r>
+              <a:rPr lang="it-IT" sz="2600" dirty="0" err="1">
+                <a:solidFill>
+                  <a:schemeClr val="tx1"/>
+                </a:solidFill>
+              </a:rPr>
+              <a:t>used</a:t>
+            </a:r>
+            <a:r>
+              <a:rPr lang="it-IT" sz="2600" dirty="0">
+                <a:solidFill>
+                  <a:schemeClr val="tx1"/>
+                </a:solidFill>
+              </a:rPr>
+              <a:t> </a:t>
+            </a:r>
+            <a:r>
+              <a:rPr lang="it-IT" sz="2600" dirty="0" err="1">
+                <a:solidFill>
+                  <a:schemeClr val="tx1"/>
+                </a:solidFill>
+              </a:rPr>
+              <a:t>two</a:t>
+            </a:r>
+            <a:r>
+              <a:rPr lang="it-IT" sz="2600" dirty="0">
+                <a:solidFill>
+                  <a:schemeClr val="tx1"/>
+                </a:solidFill>
+              </a:rPr>
+              <a:t> </a:t>
+            </a:r>
+            <a:r>
+              <a:rPr lang="it-IT" sz="2600" dirty="0" err="1">
+                <a:solidFill>
+                  <a:schemeClr val="tx1"/>
+                </a:solidFill>
+              </a:rPr>
+              <a:t>different</a:t>
+            </a:r>
+            <a:r>
+              <a:rPr lang="it-IT" sz="2600" dirty="0">
+                <a:solidFill>
+                  <a:schemeClr val="tx1"/>
+                </a:solidFill>
+              </a:rPr>
+              <a:t> setups, an AMD </a:t>
+            </a:r>
+            <a:r>
+              <a:rPr lang="it-IT" sz="2600" dirty="0" err="1">
+                <a:solidFill>
+                  <a:schemeClr val="tx1"/>
+                </a:solidFill>
+              </a:rPr>
+              <a:t>Ryzen</a:t>
+            </a:r>
+            <a:r>
+              <a:rPr lang="it-IT" sz="2600" dirty="0">
+                <a:solidFill>
+                  <a:schemeClr val="tx1"/>
+                </a:solidFill>
+              </a:rPr>
+              <a:t> 9 3900x @ 4.6 GHz with 16 GB DDR4 @ 3200 MHz and a </a:t>
+            </a:r>
+            <a:r>
+              <a:rPr lang="it-IT" sz="2600" dirty="0" err="1">
+                <a:solidFill>
+                  <a:schemeClr val="tx1"/>
+                </a:solidFill>
+              </a:rPr>
+              <a:t>Broadcom</a:t>
+            </a:r>
+            <a:r>
+              <a:rPr lang="it-IT" sz="2600" dirty="0">
+                <a:solidFill>
+                  <a:schemeClr val="tx1"/>
+                </a:solidFill>
+              </a:rPr>
+              <a:t> BCM2711 @ 1.5 GHz with 8 GB LPDDR4 @ </a:t>
+            </a:r>
+            <a:r>
+              <a:rPr lang="it-IT" sz="2600">
+                <a:solidFill>
+                  <a:schemeClr val="tx1"/>
+                </a:solidFill>
+              </a:rPr>
+              <a:t>3200 MHz.</a:t>
+            </a:r>
+            <a:endParaRPr lang="en-US" sz="2600" dirty="0">
+              <a:solidFill>
+                <a:schemeClr val="tx1"/>
+              </a:solidFill>
+            </a:endParaRPr>
+          </a:p>
+          <a:p>
+            <a:pPr marL="0" indent="0">
+              <a:lnSpc>
+                <a:spcPct val="100000"/>
+              </a:lnSpc>
+              <a:buNone/>
+            </a:pPr>
+            <a:endParaRPr lang="it-IT" sz="2600" dirty="0">
+              <a:solidFill>
+                <a:schemeClr val="tx1"/>
+              </a:solidFill>
+            </a:endParaRPr>
+          </a:p>
+          <a:p>
+            <a:pPr marL="0" indent="0">
+              <a:lnSpc>
+                <a:spcPct val="100000"/>
+              </a:lnSpc>
+              <a:buNone/>
+            </a:pPr>
+            <a:r>
+              <a:rPr lang="it-IT" sz="2600" dirty="0">
+                <a:solidFill>
+                  <a:schemeClr val="tx1"/>
+                </a:solidFill>
+              </a:rPr>
+              <a:t> </a:t>
+            </a:r>
+          </a:p>
+        </p:txBody>
+      </p:sp>
     </p:spTree>
     <p:extLst>
       <p:ext uri="{BB962C8B-B14F-4D97-AF65-F5344CB8AC3E}">
         <p14:creationId xmlns:p14="http://schemas.microsoft.com/office/powerpoint/2010/main" val="4266073266"/>
+      </p:ext>
+    </p:extLst>
+  </p:cSld>
+  <p:clrMapOvr>
+    <a:masterClrMapping/>
+  </p:clrMapOvr>
+</p:sld>
+</file>
+
+<file path=ppt/slides/slide15.xml><?xml version="1.0" encoding="utf-8"?>
+<p:sld xmlns:a="http://schemas.openxmlformats.org/drawingml/2006/main" xmlns:r="http://schemas.openxmlformats.org/officeDocument/2006/relationships" xmlns:p="http://schemas.openxmlformats.org/presentationml/2006/main">
+  <p:cSld>
+    <p:spTree>
+      <p:nvGrpSpPr>
+        <p:cNvPr id="1" name=""/>
+        <p:cNvGrpSpPr/>
+        <p:nvPr/>
+      </p:nvGrpSpPr>
+      <p:grpSpPr>
+        <a:xfrm>
+          <a:off x="0" y="0"/>
+          <a:ext cx="0" cy="0"/>
+          <a:chOff x="0" y="0"/>
+          <a:chExt cx="0" cy="0"/>
+        </a:xfrm>
+      </p:grpSpPr>
+      <p:sp>
+        <p:nvSpPr>
+          <p:cNvPr id="2" name="Titolo 1">
+            <a:extLst>
+              <a:ext uri="{FF2B5EF4-FFF2-40B4-BE49-F238E27FC236}">
+                <a16:creationId xmlns:a16="http://schemas.microsoft.com/office/drawing/2014/main" id="{92260F29-11ED-4A37-8C5D-A0D4CCE9177A}"/>
+              </a:ext>
+            </a:extLst>
+          </p:cNvPr>
+          <p:cNvSpPr>
+            <a:spLocks noGrp="1"/>
+          </p:cNvSpPr>
+          <p:nvPr>
+            <p:ph type="title"/>
+          </p:nvPr>
+        </p:nvSpPr>
+        <p:spPr>
+          <a:xfrm>
+            <a:off x="576072" y="365125"/>
+            <a:ext cx="10771632" cy="1325563"/>
+          </a:xfrm>
+        </p:spPr>
+        <p:txBody>
+          <a:bodyPr anchor="ctr">
+            <a:normAutofit/>
+          </a:bodyPr>
+          <a:lstStyle/>
+          <a:p>
+            <a:r>
+              <a:rPr lang="it-IT" dirty="0">
+                <a:solidFill>
+                  <a:schemeClr val="tx1"/>
+                </a:solidFill>
+              </a:rPr>
+              <a:t>Test </a:t>
+            </a:r>
+            <a:r>
+              <a:rPr lang="it-IT" dirty="0" err="1">
+                <a:solidFill>
+                  <a:schemeClr val="tx1"/>
+                </a:solidFill>
+              </a:rPr>
+              <a:t>without</a:t>
+            </a:r>
+            <a:r>
+              <a:rPr lang="it-IT" dirty="0">
+                <a:solidFill>
+                  <a:schemeClr val="tx1"/>
+                </a:solidFill>
+              </a:rPr>
+              <a:t> </a:t>
+            </a:r>
+            <a:r>
+              <a:rPr lang="it-IT" dirty="0" err="1">
+                <a:solidFill>
+                  <a:schemeClr val="tx1"/>
+                </a:solidFill>
+              </a:rPr>
+              <a:t>rcm</a:t>
+            </a:r>
+            <a:r>
+              <a:rPr lang="it-IT" dirty="0">
+                <a:solidFill>
+                  <a:schemeClr val="tx1"/>
+                </a:solidFill>
+              </a:rPr>
+              <a:t> 3900x</a:t>
+            </a:r>
+          </a:p>
+        </p:txBody>
+      </p:sp>
+      <p:pic>
+        <p:nvPicPr>
+          <p:cNvPr id="6" name="Segnaposto contenuto 5">
+            <a:extLst>
+              <a:ext uri="{FF2B5EF4-FFF2-40B4-BE49-F238E27FC236}">
+                <a16:creationId xmlns:a16="http://schemas.microsoft.com/office/drawing/2014/main" id="{6FC10359-CA26-43BE-9AE2-8E9133974749}"/>
+              </a:ext>
+            </a:extLst>
+          </p:cNvPr>
+          <p:cNvPicPr>
+            <a:picLocks noGrp="1" noChangeAspect="1"/>
+          </p:cNvPicPr>
+          <p:nvPr>
+            <p:ph idx="1"/>
+          </p:nvPr>
+        </p:nvPicPr>
+        <p:blipFill>
+          <a:blip r:embed="rId2"/>
+          <a:stretch>
+            <a:fillRect/>
+          </a:stretch>
+        </p:blipFill>
+        <p:spPr>
+          <a:xfrm>
+            <a:off x="356400" y="1875600"/>
+            <a:ext cx="5486400" cy="4114800"/>
+          </a:xfrm>
+        </p:spPr>
+      </p:pic>
+      <p:pic>
+        <p:nvPicPr>
+          <p:cNvPr id="9" name="Immagine 8">
+            <a:extLst>
+              <a:ext uri="{FF2B5EF4-FFF2-40B4-BE49-F238E27FC236}">
+                <a16:creationId xmlns:a16="http://schemas.microsoft.com/office/drawing/2014/main" id="{5914E1AF-A5E8-41CC-B28E-797F242D9C8D}"/>
+              </a:ext>
+            </a:extLst>
+          </p:cNvPr>
+          <p:cNvPicPr>
+            <a:picLocks noChangeAspect="1"/>
+          </p:cNvPicPr>
+          <p:nvPr/>
+        </p:nvPicPr>
+        <p:blipFill>
+          <a:blip r:embed="rId3"/>
+          <a:stretch>
+            <a:fillRect/>
+          </a:stretch>
+        </p:blipFill>
+        <p:spPr>
+          <a:xfrm>
+            <a:off x="6310800" y="1875600"/>
+            <a:ext cx="5486400" cy="4114800"/>
+          </a:xfrm>
+          <a:prstGeom prst="rect">
+            <a:avLst/>
+          </a:prstGeom>
+        </p:spPr>
+      </p:pic>
+    </p:spTree>
+    <p:extLst>
+      <p:ext uri="{BB962C8B-B14F-4D97-AF65-F5344CB8AC3E}">
+        <p14:creationId xmlns:p14="http://schemas.microsoft.com/office/powerpoint/2010/main" val="3467083650"/>
+      </p:ext>
+    </p:extLst>
+  </p:cSld>
+  <p:clrMapOvr>
+    <a:masterClrMapping/>
+  </p:clrMapOvr>
+</p:sld>
+</file>
+
+<file path=ppt/slides/slide16.xml><?xml version="1.0" encoding="utf-8"?>
+<p:sld xmlns:a="http://schemas.openxmlformats.org/drawingml/2006/main" xmlns:r="http://schemas.openxmlformats.org/officeDocument/2006/relationships" xmlns:p="http://schemas.openxmlformats.org/presentationml/2006/main">
+  <p:cSld>
+    <p:spTree>
+      <p:nvGrpSpPr>
+        <p:cNvPr id="1" name=""/>
+        <p:cNvGrpSpPr/>
+        <p:nvPr/>
+      </p:nvGrpSpPr>
+      <p:grpSpPr>
+        <a:xfrm>
+          <a:off x="0" y="0"/>
+          <a:ext cx="0" cy="0"/>
+          <a:chOff x="0" y="0"/>
+          <a:chExt cx="0" cy="0"/>
+        </a:xfrm>
+      </p:grpSpPr>
+      <p:sp>
+        <p:nvSpPr>
+          <p:cNvPr id="2" name="Titolo 1">
+            <a:extLst>
+              <a:ext uri="{FF2B5EF4-FFF2-40B4-BE49-F238E27FC236}">
+                <a16:creationId xmlns:a16="http://schemas.microsoft.com/office/drawing/2014/main" id="{92260F29-11ED-4A37-8C5D-A0D4CCE9177A}"/>
+              </a:ext>
+            </a:extLst>
+          </p:cNvPr>
+          <p:cNvSpPr>
+            <a:spLocks noGrp="1"/>
+          </p:cNvSpPr>
+          <p:nvPr>
+            <p:ph type="title"/>
+          </p:nvPr>
+        </p:nvSpPr>
+        <p:spPr>
+          <a:xfrm>
+            <a:off x="576072" y="365125"/>
+            <a:ext cx="10771632" cy="1325563"/>
+          </a:xfrm>
+        </p:spPr>
+        <p:txBody>
+          <a:bodyPr anchor="ctr">
+            <a:normAutofit/>
+          </a:bodyPr>
+          <a:lstStyle/>
+          <a:p>
+            <a:r>
+              <a:rPr lang="it-IT" dirty="0">
+                <a:solidFill>
+                  <a:schemeClr val="tx1"/>
+                </a:solidFill>
+              </a:rPr>
+              <a:t>Test with </a:t>
+            </a:r>
+            <a:r>
+              <a:rPr lang="it-IT" dirty="0" err="1">
+                <a:solidFill>
+                  <a:schemeClr val="tx1"/>
+                </a:solidFill>
+              </a:rPr>
+              <a:t>rcm</a:t>
+            </a:r>
+            <a:r>
+              <a:rPr lang="it-IT" dirty="0">
+                <a:solidFill>
+                  <a:schemeClr val="tx1"/>
+                </a:solidFill>
+              </a:rPr>
+              <a:t> 3900x</a:t>
+            </a:r>
+          </a:p>
+        </p:txBody>
+      </p:sp>
+      <p:pic>
+        <p:nvPicPr>
+          <p:cNvPr id="5" name="Segnaposto contenuto 4">
+            <a:extLst>
+              <a:ext uri="{FF2B5EF4-FFF2-40B4-BE49-F238E27FC236}">
+                <a16:creationId xmlns:a16="http://schemas.microsoft.com/office/drawing/2014/main" id="{E9255F73-AA06-4273-AAF0-B0971DCA1206}"/>
+              </a:ext>
+            </a:extLst>
+          </p:cNvPr>
+          <p:cNvPicPr>
+            <a:picLocks noGrp="1" noChangeAspect="1"/>
+          </p:cNvPicPr>
+          <p:nvPr>
+            <p:ph idx="1"/>
+          </p:nvPr>
+        </p:nvPicPr>
+        <p:blipFill>
+          <a:blip r:embed="rId2"/>
+          <a:stretch>
+            <a:fillRect/>
+          </a:stretch>
+        </p:blipFill>
+        <p:spPr>
+          <a:xfrm>
+            <a:off x="356400" y="1875600"/>
+            <a:ext cx="5486400" cy="4114800"/>
+          </a:xfrm>
+        </p:spPr>
+      </p:pic>
+      <p:pic>
+        <p:nvPicPr>
+          <p:cNvPr id="7" name="Immagine 6">
+            <a:extLst>
+              <a:ext uri="{FF2B5EF4-FFF2-40B4-BE49-F238E27FC236}">
+                <a16:creationId xmlns:a16="http://schemas.microsoft.com/office/drawing/2014/main" id="{64AB8974-2ABF-4C1D-A2A6-6180F423DD7D}"/>
+              </a:ext>
+            </a:extLst>
+          </p:cNvPr>
+          <p:cNvPicPr>
+            <a:picLocks noChangeAspect="1"/>
+          </p:cNvPicPr>
+          <p:nvPr/>
+        </p:nvPicPr>
+        <p:blipFill>
+          <a:blip r:embed="rId3"/>
+          <a:stretch>
+            <a:fillRect/>
+          </a:stretch>
+        </p:blipFill>
+        <p:spPr>
+          <a:xfrm>
+            <a:off x="6310800" y="1875600"/>
+            <a:ext cx="5486400" cy="4114800"/>
+          </a:xfrm>
+          <a:prstGeom prst="rect">
+            <a:avLst/>
+          </a:prstGeom>
+        </p:spPr>
+      </p:pic>
+    </p:spTree>
+    <p:extLst>
+      <p:ext uri="{BB962C8B-B14F-4D97-AF65-F5344CB8AC3E}">
+        <p14:creationId xmlns:p14="http://schemas.microsoft.com/office/powerpoint/2010/main" val="4211842913"/>
+      </p:ext>
+    </p:extLst>
+  </p:cSld>
+  <p:clrMapOvr>
+    <a:masterClrMapping/>
+  </p:clrMapOvr>
+</p:sld>
+</file>
+
+<file path=ppt/slides/slide17.xml><?xml version="1.0" encoding="utf-8"?>
+<p:sld xmlns:a="http://schemas.openxmlformats.org/drawingml/2006/main" xmlns:r="http://schemas.openxmlformats.org/officeDocument/2006/relationships" xmlns:p="http://schemas.openxmlformats.org/presentationml/2006/main">
+  <p:cSld>
+    <p:spTree>
+      <p:nvGrpSpPr>
+        <p:cNvPr id="1" name=""/>
+        <p:cNvGrpSpPr/>
+        <p:nvPr/>
+      </p:nvGrpSpPr>
+      <p:grpSpPr>
+        <a:xfrm>
+          <a:off x="0" y="0"/>
+          <a:ext cx="0" cy="0"/>
+          <a:chOff x="0" y="0"/>
+          <a:chExt cx="0" cy="0"/>
+        </a:xfrm>
+      </p:grpSpPr>
+      <p:sp>
+        <p:nvSpPr>
+          <p:cNvPr id="2" name="Titolo 1">
+            <a:extLst>
+              <a:ext uri="{FF2B5EF4-FFF2-40B4-BE49-F238E27FC236}">
+                <a16:creationId xmlns:a16="http://schemas.microsoft.com/office/drawing/2014/main" id="{92260F29-11ED-4A37-8C5D-A0D4CCE9177A}"/>
+              </a:ext>
+            </a:extLst>
+          </p:cNvPr>
+          <p:cNvSpPr>
+            <a:spLocks noGrp="1"/>
+          </p:cNvSpPr>
+          <p:nvPr>
+            <p:ph type="title"/>
+          </p:nvPr>
+        </p:nvSpPr>
+        <p:spPr>
+          <a:xfrm>
+            <a:off x="576072" y="365125"/>
+            <a:ext cx="10771632" cy="1325563"/>
+          </a:xfrm>
+        </p:spPr>
+        <p:txBody>
+          <a:bodyPr anchor="ctr">
+            <a:normAutofit/>
+          </a:bodyPr>
+          <a:lstStyle/>
+          <a:p>
+            <a:r>
+              <a:rPr lang="it-IT" dirty="0">
+                <a:solidFill>
+                  <a:schemeClr val="tx1"/>
+                </a:solidFill>
+              </a:rPr>
+              <a:t>Test </a:t>
+            </a:r>
+            <a:r>
+              <a:rPr lang="it-IT" dirty="0" err="1">
+                <a:solidFill>
+                  <a:schemeClr val="tx1"/>
+                </a:solidFill>
+              </a:rPr>
+              <a:t>without</a:t>
+            </a:r>
+            <a:r>
+              <a:rPr lang="it-IT" dirty="0">
+                <a:solidFill>
+                  <a:schemeClr val="tx1"/>
+                </a:solidFill>
+              </a:rPr>
+              <a:t> </a:t>
+            </a:r>
+            <a:r>
+              <a:rPr lang="it-IT" dirty="0" err="1">
+                <a:solidFill>
+                  <a:schemeClr val="tx1"/>
+                </a:solidFill>
+              </a:rPr>
+              <a:t>rcm</a:t>
+            </a:r>
+            <a:r>
+              <a:rPr lang="it-IT" dirty="0">
+                <a:solidFill>
+                  <a:schemeClr val="tx1"/>
+                </a:solidFill>
+              </a:rPr>
+              <a:t> bcm2711</a:t>
+            </a:r>
+          </a:p>
+        </p:txBody>
+      </p:sp>
+      <p:pic>
+        <p:nvPicPr>
+          <p:cNvPr id="5" name="Segnaposto contenuto 4">
+            <a:extLst>
+              <a:ext uri="{FF2B5EF4-FFF2-40B4-BE49-F238E27FC236}">
+                <a16:creationId xmlns:a16="http://schemas.microsoft.com/office/drawing/2014/main" id="{7A141EBB-02C6-4725-81E3-A7C0AA364093}"/>
+              </a:ext>
+            </a:extLst>
+          </p:cNvPr>
+          <p:cNvPicPr>
+            <a:picLocks noGrp="1" noChangeAspect="1"/>
+          </p:cNvPicPr>
+          <p:nvPr>
+            <p:ph idx="1"/>
+          </p:nvPr>
+        </p:nvPicPr>
+        <p:blipFill>
+          <a:blip r:embed="rId2"/>
+          <a:stretch>
+            <a:fillRect/>
+          </a:stretch>
+        </p:blipFill>
+        <p:spPr>
+          <a:xfrm>
+            <a:off x="356400" y="1875600"/>
+            <a:ext cx="5486400" cy="4114800"/>
+          </a:xfrm>
+        </p:spPr>
+      </p:pic>
+      <p:pic>
+        <p:nvPicPr>
+          <p:cNvPr id="7" name="Immagine 6">
+            <a:extLst>
+              <a:ext uri="{FF2B5EF4-FFF2-40B4-BE49-F238E27FC236}">
+                <a16:creationId xmlns:a16="http://schemas.microsoft.com/office/drawing/2014/main" id="{A37F1D62-8C19-4E35-9BAC-FDDD6BBF889B}"/>
+              </a:ext>
+            </a:extLst>
+          </p:cNvPr>
+          <p:cNvPicPr>
+            <a:picLocks noChangeAspect="1"/>
+          </p:cNvPicPr>
+          <p:nvPr/>
+        </p:nvPicPr>
+        <p:blipFill>
+          <a:blip r:embed="rId3"/>
+          <a:stretch>
+            <a:fillRect/>
+          </a:stretch>
+        </p:blipFill>
+        <p:spPr>
+          <a:xfrm>
+            <a:off x="6310800" y="1875600"/>
+            <a:ext cx="5486400" cy="4114800"/>
+          </a:xfrm>
+          <a:prstGeom prst="rect">
+            <a:avLst/>
+          </a:prstGeom>
+        </p:spPr>
+      </p:pic>
+    </p:spTree>
+    <p:extLst>
+      <p:ext uri="{BB962C8B-B14F-4D97-AF65-F5344CB8AC3E}">
+        <p14:creationId xmlns:p14="http://schemas.microsoft.com/office/powerpoint/2010/main" val="2267199963"/>
+      </p:ext>
+    </p:extLst>
+  </p:cSld>
+  <p:clrMapOvr>
+    <a:masterClrMapping/>
+  </p:clrMapOvr>
+</p:sld>
+</file>
+
+<file path=ppt/slides/slide18.xml><?xml version="1.0" encoding="utf-8"?>
+<p:sld xmlns:a="http://schemas.openxmlformats.org/drawingml/2006/main" xmlns:r="http://schemas.openxmlformats.org/officeDocument/2006/relationships" xmlns:p="http://schemas.openxmlformats.org/presentationml/2006/main">
+  <p:cSld>
+    <p:spTree>
+      <p:nvGrpSpPr>
+        <p:cNvPr id="1" name=""/>
+        <p:cNvGrpSpPr/>
+        <p:nvPr/>
+      </p:nvGrpSpPr>
+      <p:grpSpPr>
+        <a:xfrm>
+          <a:off x="0" y="0"/>
+          <a:ext cx="0" cy="0"/>
+          <a:chOff x="0" y="0"/>
+          <a:chExt cx="0" cy="0"/>
+        </a:xfrm>
+      </p:grpSpPr>
+      <p:sp>
+        <p:nvSpPr>
+          <p:cNvPr id="2" name="Titolo 1">
+            <a:extLst>
+              <a:ext uri="{FF2B5EF4-FFF2-40B4-BE49-F238E27FC236}">
+                <a16:creationId xmlns:a16="http://schemas.microsoft.com/office/drawing/2014/main" id="{92260F29-11ED-4A37-8C5D-A0D4CCE9177A}"/>
+              </a:ext>
+            </a:extLst>
+          </p:cNvPr>
+          <p:cNvSpPr>
+            <a:spLocks noGrp="1"/>
+          </p:cNvSpPr>
+          <p:nvPr>
+            <p:ph type="title"/>
+          </p:nvPr>
+        </p:nvSpPr>
+        <p:spPr>
+          <a:xfrm>
+            <a:off x="576072" y="365125"/>
+            <a:ext cx="10771632" cy="1325563"/>
+          </a:xfrm>
+        </p:spPr>
+        <p:txBody>
+          <a:bodyPr anchor="ctr">
+            <a:normAutofit/>
+          </a:bodyPr>
+          <a:lstStyle/>
+          <a:p>
+            <a:r>
+              <a:rPr lang="it-IT" dirty="0">
+                <a:solidFill>
+                  <a:schemeClr val="tx1"/>
+                </a:solidFill>
+              </a:rPr>
+              <a:t>Test with </a:t>
+            </a:r>
+            <a:r>
+              <a:rPr lang="it-IT" dirty="0" err="1">
+                <a:solidFill>
+                  <a:schemeClr val="tx1"/>
+                </a:solidFill>
+              </a:rPr>
+              <a:t>rcm</a:t>
+            </a:r>
+            <a:r>
+              <a:rPr lang="it-IT" dirty="0">
+                <a:solidFill>
+                  <a:schemeClr val="tx1"/>
+                </a:solidFill>
+              </a:rPr>
+              <a:t> bcm2711</a:t>
+            </a:r>
+          </a:p>
+        </p:txBody>
+      </p:sp>
+      <p:pic>
+        <p:nvPicPr>
+          <p:cNvPr id="5" name="Segnaposto contenuto 4">
+            <a:extLst>
+              <a:ext uri="{FF2B5EF4-FFF2-40B4-BE49-F238E27FC236}">
+                <a16:creationId xmlns:a16="http://schemas.microsoft.com/office/drawing/2014/main" id="{536F8BAB-1008-46DE-9427-CF0EBCEF2398}"/>
+              </a:ext>
+            </a:extLst>
+          </p:cNvPr>
+          <p:cNvPicPr>
+            <a:picLocks noGrp="1" noChangeAspect="1"/>
+          </p:cNvPicPr>
+          <p:nvPr>
+            <p:ph idx="1"/>
+          </p:nvPr>
+        </p:nvPicPr>
+        <p:blipFill>
+          <a:blip r:embed="rId2"/>
+          <a:stretch>
+            <a:fillRect/>
+          </a:stretch>
+        </p:blipFill>
+        <p:spPr>
+          <a:xfrm>
+            <a:off x="356400" y="1875600"/>
+            <a:ext cx="5486400" cy="4114800"/>
+          </a:xfrm>
+        </p:spPr>
+      </p:pic>
+      <p:pic>
+        <p:nvPicPr>
+          <p:cNvPr id="7" name="Immagine 6">
+            <a:extLst>
+              <a:ext uri="{FF2B5EF4-FFF2-40B4-BE49-F238E27FC236}">
+                <a16:creationId xmlns:a16="http://schemas.microsoft.com/office/drawing/2014/main" id="{207B272B-53D4-4251-96BD-423E3549E035}"/>
+              </a:ext>
+            </a:extLst>
+          </p:cNvPr>
+          <p:cNvPicPr>
+            <a:picLocks noChangeAspect="1"/>
+          </p:cNvPicPr>
+          <p:nvPr/>
+        </p:nvPicPr>
+        <p:blipFill>
+          <a:blip r:embed="rId3"/>
+          <a:stretch>
+            <a:fillRect/>
+          </a:stretch>
+        </p:blipFill>
+        <p:spPr>
+          <a:xfrm>
+            <a:off x="6310800" y="1875600"/>
+            <a:ext cx="5486400" cy="4114800"/>
+          </a:xfrm>
+          <a:prstGeom prst="rect">
+            <a:avLst/>
+          </a:prstGeom>
+        </p:spPr>
+      </p:pic>
+    </p:spTree>
+    <p:extLst>
+      <p:ext uri="{BB962C8B-B14F-4D97-AF65-F5344CB8AC3E}">
+        <p14:creationId xmlns:p14="http://schemas.microsoft.com/office/powerpoint/2010/main" val="1874635005"/>
+      </p:ext>
+    </p:extLst>
+  </p:cSld>
+  <p:clrMapOvr>
+    <a:masterClrMapping/>
+  </p:clrMapOvr>
+</p:sld>
+</file>
+
+<file path=ppt/slides/slide19.xml><?xml version="1.0" encoding="utf-8"?>
+<p:sld xmlns:a="http://schemas.openxmlformats.org/drawingml/2006/main" xmlns:r="http://schemas.openxmlformats.org/officeDocument/2006/relationships" xmlns:p="http://schemas.openxmlformats.org/presentationml/2006/main">
+  <p:cSld>
+    <p:spTree>
+      <p:nvGrpSpPr>
+        <p:cNvPr id="1" name=""/>
+        <p:cNvGrpSpPr/>
+        <p:nvPr/>
+      </p:nvGrpSpPr>
+      <p:grpSpPr>
+        <a:xfrm>
+          <a:off x="0" y="0"/>
+          <a:ext cx="0" cy="0"/>
+          <a:chOff x="0" y="0"/>
+          <a:chExt cx="0" cy="0"/>
+        </a:xfrm>
+      </p:grpSpPr>
+      <p:sp>
+        <p:nvSpPr>
+          <p:cNvPr id="2" name="Titolo 1">
+            <a:extLst>
+              <a:ext uri="{FF2B5EF4-FFF2-40B4-BE49-F238E27FC236}">
+                <a16:creationId xmlns:a16="http://schemas.microsoft.com/office/drawing/2014/main" id="{92260F29-11ED-4A37-8C5D-A0D4CCE9177A}"/>
+              </a:ext>
+            </a:extLst>
+          </p:cNvPr>
+          <p:cNvSpPr>
+            <a:spLocks noGrp="1"/>
+          </p:cNvSpPr>
+          <p:nvPr>
+            <p:ph type="title"/>
+          </p:nvPr>
+        </p:nvSpPr>
+        <p:spPr>
+          <a:xfrm>
+            <a:off x="576072" y="365125"/>
+            <a:ext cx="10771632" cy="1325563"/>
+          </a:xfrm>
+        </p:spPr>
+        <p:txBody>
+          <a:bodyPr anchor="ctr">
+            <a:normAutofit/>
+          </a:bodyPr>
+          <a:lstStyle/>
+          <a:p>
+            <a:r>
+              <a:rPr lang="it-IT" dirty="0" err="1">
+                <a:solidFill>
+                  <a:schemeClr val="tx1"/>
+                </a:solidFill>
+              </a:rPr>
+              <a:t>Conclusions</a:t>
+            </a:r>
+            <a:endParaRPr lang="it-IT" dirty="0">
+              <a:solidFill>
+                <a:schemeClr val="tx1"/>
+              </a:solidFill>
+            </a:endParaRPr>
+          </a:p>
+        </p:txBody>
+      </p:sp>
+      <p:sp>
+        <p:nvSpPr>
+          <p:cNvPr id="4" name="Segnaposto contenuto 3">
+            <a:extLst>
+              <a:ext uri="{FF2B5EF4-FFF2-40B4-BE49-F238E27FC236}">
+                <a16:creationId xmlns:a16="http://schemas.microsoft.com/office/drawing/2014/main" id="{35DA987C-AED4-48E5-97EA-7FB182B69141}"/>
+              </a:ext>
+            </a:extLst>
+          </p:cNvPr>
+          <p:cNvSpPr>
+            <a:spLocks noGrp="1"/>
+          </p:cNvSpPr>
+          <p:nvPr>
+            <p:ph idx="1"/>
+          </p:nvPr>
+        </p:nvSpPr>
+        <p:spPr/>
+        <p:txBody>
+          <a:bodyPr/>
+          <a:lstStyle/>
+          <a:p>
+            <a:r>
+              <a:rPr lang="it-IT" dirty="0" err="1">
+                <a:solidFill>
+                  <a:schemeClr val="tx1"/>
+                </a:solidFill>
+              </a:rPr>
+              <a:t>As</a:t>
+            </a:r>
+            <a:r>
+              <a:rPr lang="it-IT" dirty="0">
+                <a:solidFill>
+                  <a:schemeClr val="tx1"/>
+                </a:solidFill>
+              </a:rPr>
+              <a:t> </a:t>
+            </a:r>
+            <a:r>
+              <a:rPr lang="it-IT" dirty="0" err="1">
+                <a:solidFill>
+                  <a:schemeClr val="tx1"/>
+                </a:solidFill>
+              </a:rPr>
+              <a:t>we</a:t>
+            </a:r>
+            <a:r>
+              <a:rPr lang="it-IT" dirty="0">
+                <a:solidFill>
+                  <a:schemeClr val="tx1"/>
+                </a:solidFill>
+              </a:rPr>
+              <a:t> can </a:t>
+            </a:r>
+            <a:r>
+              <a:rPr lang="it-IT" dirty="0" err="1">
+                <a:solidFill>
+                  <a:schemeClr val="tx1"/>
+                </a:solidFill>
+              </a:rPr>
+              <a:t>see</a:t>
+            </a:r>
+            <a:r>
+              <a:rPr lang="it-IT" dirty="0">
+                <a:solidFill>
+                  <a:schemeClr val="tx1"/>
+                </a:solidFill>
+              </a:rPr>
+              <a:t> from the plots, testing the code on the 3900x </a:t>
+            </a:r>
+            <a:r>
+              <a:rPr lang="it-IT" dirty="0" err="1">
+                <a:solidFill>
+                  <a:schemeClr val="tx1"/>
+                </a:solidFill>
+              </a:rPr>
+              <a:t>gives</a:t>
+            </a:r>
+            <a:r>
+              <a:rPr lang="it-IT" dirty="0">
+                <a:solidFill>
+                  <a:schemeClr val="tx1"/>
+                </a:solidFill>
+              </a:rPr>
+              <a:t> comparable </a:t>
+            </a:r>
+            <a:r>
+              <a:rPr lang="it-IT" dirty="0" err="1">
+                <a:solidFill>
+                  <a:schemeClr val="tx1"/>
+                </a:solidFill>
+              </a:rPr>
+              <a:t>values</a:t>
+            </a:r>
+            <a:r>
+              <a:rPr lang="it-IT" dirty="0">
+                <a:solidFill>
+                  <a:schemeClr val="tx1"/>
+                </a:solidFill>
+              </a:rPr>
+              <a:t> running the CAHD </a:t>
+            </a:r>
+            <a:r>
+              <a:rPr lang="it-IT" dirty="0" err="1">
+                <a:solidFill>
+                  <a:schemeClr val="tx1"/>
+                </a:solidFill>
+              </a:rPr>
+              <a:t>algorithm</a:t>
+            </a:r>
+            <a:r>
+              <a:rPr lang="it-IT" dirty="0">
+                <a:solidFill>
+                  <a:schemeClr val="tx1"/>
+                </a:solidFill>
+              </a:rPr>
+              <a:t> with and </a:t>
+            </a:r>
+            <a:r>
+              <a:rPr lang="it-IT" dirty="0" err="1">
+                <a:solidFill>
+                  <a:schemeClr val="tx1"/>
+                </a:solidFill>
+              </a:rPr>
+              <a:t>without</a:t>
+            </a:r>
+            <a:r>
+              <a:rPr lang="it-IT" dirty="0">
+                <a:solidFill>
+                  <a:schemeClr val="tx1"/>
+                </a:solidFill>
+              </a:rPr>
+              <a:t> the RCM, </a:t>
+            </a:r>
+            <a:r>
+              <a:rPr lang="it-IT" dirty="0" err="1">
+                <a:solidFill>
+                  <a:schemeClr val="tx1"/>
+                </a:solidFill>
+              </a:rPr>
+              <a:t>instead</a:t>
+            </a:r>
+            <a:r>
+              <a:rPr lang="it-IT" dirty="0">
+                <a:solidFill>
+                  <a:schemeClr val="tx1"/>
+                </a:solidFill>
+              </a:rPr>
+              <a:t> with a setup </a:t>
+            </a:r>
+            <a:r>
+              <a:rPr lang="it-IT" dirty="0" err="1">
+                <a:solidFill>
+                  <a:schemeClr val="tx1"/>
+                </a:solidFill>
+              </a:rPr>
+              <a:t>that</a:t>
+            </a:r>
+            <a:r>
+              <a:rPr lang="it-IT" dirty="0">
+                <a:solidFill>
+                  <a:schemeClr val="tx1"/>
+                </a:solidFill>
+              </a:rPr>
+              <a:t> </a:t>
+            </a:r>
+            <a:r>
+              <a:rPr lang="it-IT" dirty="0" err="1">
+                <a:solidFill>
+                  <a:schemeClr val="tx1"/>
+                </a:solidFill>
+              </a:rPr>
+              <a:t>isn’t</a:t>
+            </a:r>
+            <a:r>
+              <a:rPr lang="it-IT" dirty="0">
+                <a:solidFill>
+                  <a:schemeClr val="tx1"/>
+                </a:solidFill>
+              </a:rPr>
+              <a:t> </a:t>
+            </a:r>
+            <a:r>
+              <a:rPr lang="it-IT" dirty="0" err="1">
+                <a:solidFill>
+                  <a:schemeClr val="tx1"/>
+                </a:solidFill>
+              </a:rPr>
+              <a:t>as</a:t>
+            </a:r>
+            <a:r>
+              <a:rPr lang="it-IT" dirty="0">
+                <a:solidFill>
+                  <a:schemeClr val="tx1"/>
+                </a:solidFill>
+              </a:rPr>
+              <a:t> </a:t>
+            </a:r>
+            <a:r>
+              <a:rPr lang="it-IT" dirty="0" err="1">
+                <a:solidFill>
+                  <a:schemeClr val="tx1"/>
+                </a:solidFill>
+              </a:rPr>
+              <a:t>much</a:t>
+            </a:r>
+            <a:r>
+              <a:rPr lang="it-IT" dirty="0">
+                <a:solidFill>
+                  <a:schemeClr val="tx1"/>
+                </a:solidFill>
+              </a:rPr>
+              <a:t> </a:t>
+            </a:r>
+            <a:r>
+              <a:rPr lang="it-IT" dirty="0" err="1">
+                <a:solidFill>
+                  <a:schemeClr val="tx1"/>
+                </a:solidFill>
+              </a:rPr>
+              <a:t>performing</a:t>
+            </a:r>
+            <a:r>
+              <a:rPr lang="it-IT" dirty="0">
+                <a:solidFill>
+                  <a:schemeClr val="tx1"/>
+                </a:solidFill>
+              </a:rPr>
+              <a:t>, the </a:t>
+            </a:r>
+            <a:r>
+              <a:rPr lang="it-IT" dirty="0" err="1">
+                <a:solidFill>
+                  <a:schemeClr val="tx1"/>
+                </a:solidFill>
+              </a:rPr>
+              <a:t>difference</a:t>
+            </a:r>
+            <a:r>
+              <a:rPr lang="it-IT" dirty="0">
+                <a:solidFill>
+                  <a:schemeClr val="tx1"/>
+                </a:solidFill>
+              </a:rPr>
+              <a:t> in </a:t>
+            </a:r>
+            <a:r>
+              <a:rPr lang="it-IT" dirty="0" err="1">
+                <a:solidFill>
+                  <a:schemeClr val="tx1"/>
+                </a:solidFill>
+              </a:rPr>
+              <a:t>terms</a:t>
+            </a:r>
+            <a:r>
+              <a:rPr lang="it-IT" dirty="0">
+                <a:solidFill>
+                  <a:schemeClr val="tx1"/>
+                </a:solidFill>
+              </a:rPr>
+              <a:t> of </a:t>
+            </a:r>
+            <a:r>
+              <a:rPr lang="it-IT" dirty="0" err="1">
+                <a:solidFill>
+                  <a:schemeClr val="tx1"/>
+                </a:solidFill>
+              </a:rPr>
+              <a:t>execution</a:t>
+            </a:r>
+            <a:r>
+              <a:rPr lang="it-IT" dirty="0">
+                <a:solidFill>
+                  <a:schemeClr val="tx1"/>
+                </a:solidFill>
+              </a:rPr>
+              <a:t> time can be of some seconds.</a:t>
+            </a:r>
+          </a:p>
+          <a:p>
+            <a:r>
+              <a:rPr lang="it-IT" dirty="0">
+                <a:solidFill>
+                  <a:schemeClr val="tx1"/>
+                </a:solidFill>
+              </a:rPr>
+              <a:t> </a:t>
+            </a:r>
+            <a:r>
+              <a:rPr lang="it-IT" dirty="0" err="1">
+                <a:solidFill>
+                  <a:schemeClr val="tx1"/>
+                </a:solidFill>
+              </a:rPr>
+              <a:t>We</a:t>
+            </a:r>
+            <a:r>
+              <a:rPr lang="it-IT" dirty="0">
+                <a:solidFill>
+                  <a:schemeClr val="tx1"/>
+                </a:solidFill>
+              </a:rPr>
+              <a:t> </a:t>
+            </a:r>
+            <a:r>
+              <a:rPr lang="it-IT" dirty="0" err="1">
+                <a:solidFill>
+                  <a:schemeClr val="tx1"/>
+                </a:solidFill>
+              </a:rPr>
+              <a:t>also</a:t>
+            </a:r>
+            <a:r>
+              <a:rPr lang="it-IT" dirty="0">
+                <a:solidFill>
+                  <a:schemeClr val="tx1"/>
+                </a:solidFill>
+              </a:rPr>
+              <a:t> </a:t>
+            </a:r>
+            <a:r>
+              <a:rPr lang="it-IT" dirty="0" err="1">
+                <a:solidFill>
+                  <a:schemeClr val="tx1"/>
+                </a:solidFill>
+              </a:rPr>
+              <a:t>have</a:t>
+            </a:r>
+            <a:r>
+              <a:rPr lang="it-IT" dirty="0">
+                <a:solidFill>
+                  <a:schemeClr val="tx1"/>
+                </a:solidFill>
+              </a:rPr>
+              <a:t> to take </a:t>
+            </a:r>
+            <a:r>
+              <a:rPr lang="it-IT" dirty="0" err="1">
+                <a:solidFill>
+                  <a:schemeClr val="tx1"/>
+                </a:solidFill>
+              </a:rPr>
+              <a:t>into</a:t>
+            </a:r>
+            <a:r>
+              <a:rPr lang="it-IT" dirty="0">
+                <a:solidFill>
+                  <a:schemeClr val="tx1"/>
+                </a:solidFill>
+              </a:rPr>
+              <a:t> account </a:t>
+            </a:r>
+            <a:r>
+              <a:rPr lang="it-IT" dirty="0" err="1">
+                <a:solidFill>
+                  <a:schemeClr val="tx1"/>
+                </a:solidFill>
+              </a:rPr>
+              <a:t>that</a:t>
+            </a:r>
+            <a:r>
+              <a:rPr lang="it-IT" dirty="0">
+                <a:solidFill>
+                  <a:schemeClr val="tx1"/>
+                </a:solidFill>
+              </a:rPr>
+              <a:t> Python on the </a:t>
+            </a:r>
+            <a:r>
+              <a:rPr lang="it-IT" dirty="0" err="1">
+                <a:solidFill>
+                  <a:schemeClr val="tx1"/>
+                </a:solidFill>
+              </a:rPr>
+              <a:t>Broadcom</a:t>
+            </a:r>
+            <a:r>
+              <a:rPr lang="it-IT" dirty="0">
+                <a:solidFill>
+                  <a:schemeClr val="tx1"/>
+                </a:solidFill>
+              </a:rPr>
+              <a:t> CPU </a:t>
+            </a:r>
+            <a:r>
+              <a:rPr lang="it-IT" dirty="0" err="1">
+                <a:solidFill>
+                  <a:schemeClr val="tx1"/>
+                </a:solidFill>
+              </a:rPr>
+              <a:t>that</a:t>
+            </a:r>
+            <a:r>
+              <a:rPr lang="it-IT" dirty="0">
+                <a:solidFill>
+                  <a:schemeClr val="tx1"/>
+                </a:solidFill>
+              </a:rPr>
+              <a:t> </a:t>
+            </a:r>
+            <a:r>
+              <a:rPr lang="it-IT" dirty="0" err="1">
+                <a:solidFill>
+                  <a:schemeClr val="tx1"/>
+                </a:solidFill>
+              </a:rPr>
+              <a:t>is</a:t>
+            </a:r>
+            <a:r>
+              <a:rPr lang="it-IT" dirty="0">
+                <a:solidFill>
+                  <a:schemeClr val="tx1"/>
+                </a:solidFill>
+              </a:rPr>
+              <a:t> </a:t>
+            </a:r>
+            <a:r>
+              <a:rPr lang="it-IT" dirty="0" err="1">
+                <a:solidFill>
+                  <a:schemeClr val="tx1"/>
+                </a:solidFill>
+              </a:rPr>
+              <a:t>installed</a:t>
+            </a:r>
+            <a:r>
+              <a:rPr lang="it-IT" dirty="0">
+                <a:solidFill>
+                  <a:schemeClr val="tx1"/>
+                </a:solidFill>
+              </a:rPr>
+              <a:t> on a </a:t>
+            </a:r>
+            <a:r>
+              <a:rPr lang="it-IT" dirty="0" err="1">
+                <a:solidFill>
+                  <a:schemeClr val="tx1"/>
+                </a:solidFill>
+              </a:rPr>
+              <a:t>Rapberry</a:t>
+            </a:r>
+            <a:r>
+              <a:rPr lang="it-IT" dirty="0">
+                <a:solidFill>
+                  <a:schemeClr val="tx1"/>
+                </a:solidFill>
+              </a:rPr>
+              <a:t> </a:t>
+            </a:r>
+            <a:r>
+              <a:rPr lang="it-IT" dirty="0" err="1">
+                <a:solidFill>
+                  <a:schemeClr val="tx1"/>
+                </a:solidFill>
+              </a:rPr>
+              <a:t>Pi</a:t>
+            </a:r>
+            <a:r>
+              <a:rPr lang="it-IT" dirty="0">
+                <a:solidFill>
+                  <a:schemeClr val="tx1"/>
+                </a:solidFill>
+              </a:rPr>
+              <a:t> 4 </a:t>
+            </a:r>
+            <a:r>
+              <a:rPr lang="it-IT" dirty="0" err="1">
+                <a:solidFill>
+                  <a:schemeClr val="tx1"/>
+                </a:solidFill>
+              </a:rPr>
+              <a:t>runs</a:t>
+            </a:r>
+            <a:r>
+              <a:rPr lang="it-IT" dirty="0">
+                <a:solidFill>
+                  <a:schemeClr val="tx1"/>
+                </a:solidFill>
+              </a:rPr>
+              <a:t> in single core, </a:t>
+            </a:r>
+            <a:r>
+              <a:rPr lang="it-IT" dirty="0" err="1">
+                <a:solidFill>
+                  <a:schemeClr val="tx1"/>
+                </a:solidFill>
+              </a:rPr>
+              <a:t>altough</a:t>
+            </a:r>
+            <a:r>
+              <a:rPr lang="it-IT" dirty="0">
+                <a:solidFill>
+                  <a:schemeClr val="tx1"/>
+                </a:solidFill>
+              </a:rPr>
+              <a:t> </a:t>
+            </a:r>
+            <a:r>
+              <a:rPr lang="it-IT" dirty="0" err="1">
+                <a:solidFill>
+                  <a:schemeClr val="tx1"/>
+                </a:solidFill>
+              </a:rPr>
+              <a:t>it</a:t>
+            </a:r>
+            <a:r>
+              <a:rPr lang="it-IT" dirty="0">
+                <a:solidFill>
+                  <a:schemeClr val="tx1"/>
+                </a:solidFill>
+              </a:rPr>
+              <a:t> </a:t>
+            </a:r>
+            <a:r>
+              <a:rPr lang="it-IT" dirty="0" err="1">
+                <a:solidFill>
+                  <a:schemeClr val="tx1"/>
+                </a:solidFill>
+              </a:rPr>
+              <a:t>has</a:t>
+            </a:r>
+            <a:r>
+              <a:rPr lang="it-IT" dirty="0">
+                <a:solidFill>
+                  <a:schemeClr val="tx1"/>
+                </a:solidFill>
+              </a:rPr>
+              <a:t> </a:t>
+            </a:r>
+            <a:r>
+              <a:rPr lang="it-IT" dirty="0" err="1">
+                <a:solidFill>
+                  <a:schemeClr val="tx1"/>
+                </a:solidFill>
+              </a:rPr>
+              <a:t>four</a:t>
+            </a:r>
+            <a:r>
+              <a:rPr lang="it-IT" dirty="0">
+                <a:solidFill>
+                  <a:schemeClr val="tx1"/>
+                </a:solidFill>
+              </a:rPr>
+              <a:t> cores, </a:t>
+            </a:r>
+            <a:r>
+              <a:rPr lang="it-IT" dirty="0" err="1">
+                <a:solidFill>
+                  <a:schemeClr val="tx1"/>
+                </a:solidFill>
+              </a:rPr>
+              <a:t>meaning</a:t>
+            </a:r>
+            <a:r>
+              <a:rPr lang="it-IT" dirty="0">
+                <a:solidFill>
+                  <a:schemeClr val="tx1"/>
+                </a:solidFill>
+              </a:rPr>
+              <a:t> </a:t>
+            </a:r>
+            <a:r>
+              <a:rPr lang="it-IT" dirty="0" err="1">
+                <a:solidFill>
+                  <a:schemeClr val="tx1"/>
+                </a:solidFill>
+              </a:rPr>
+              <a:t>that</a:t>
+            </a:r>
+            <a:r>
+              <a:rPr lang="it-IT" dirty="0">
+                <a:solidFill>
+                  <a:schemeClr val="tx1"/>
+                </a:solidFill>
+              </a:rPr>
+              <a:t> the performance </a:t>
+            </a:r>
+            <a:r>
+              <a:rPr lang="it-IT" dirty="0" err="1">
+                <a:solidFill>
+                  <a:schemeClr val="tx1"/>
+                </a:solidFill>
+              </a:rPr>
+              <a:t>have</a:t>
+            </a:r>
+            <a:r>
+              <a:rPr lang="it-IT" dirty="0">
+                <a:solidFill>
+                  <a:schemeClr val="tx1"/>
+                </a:solidFill>
+              </a:rPr>
+              <a:t> a </a:t>
+            </a:r>
+            <a:r>
+              <a:rPr lang="it-IT" dirty="0" err="1">
+                <a:solidFill>
+                  <a:schemeClr val="tx1"/>
+                </a:solidFill>
+              </a:rPr>
+              <a:t>bottleneck</a:t>
+            </a:r>
+            <a:r>
+              <a:rPr lang="it-IT" dirty="0">
+                <a:solidFill>
+                  <a:schemeClr val="tx1"/>
+                </a:solidFill>
+              </a:rPr>
+              <a:t>.</a:t>
+            </a:r>
+          </a:p>
+        </p:txBody>
+      </p:sp>
+    </p:spTree>
+    <p:extLst>
+      <p:ext uri="{BB962C8B-B14F-4D97-AF65-F5344CB8AC3E}">
+        <p14:creationId xmlns:p14="http://schemas.microsoft.com/office/powerpoint/2010/main" val="1819767270"/>
       </p:ext>
     </p:extLst>
   </p:cSld>
@@ -13922,6 +15394,13 @@
         <p:txBody>
           <a:bodyPr/>
           <a:lstStyle/>
+          <a:p>
+            <a:endParaRPr lang="it-IT" dirty="0">
+              <a:solidFill>
+                <a:schemeClr val="tx1"/>
+              </a:solidFill>
+            </a:endParaRPr>
+          </a:p>
           <a:p>
             <a:r>
               <a:rPr lang="it-IT" dirty="0">
@@ -15990,142 +17469,11 @@
                 <a:spcPct val="110000"/>
               </a:lnSpc>
             </a:pPr>
-            <a:r>
-              <a:rPr lang="it-IT" dirty="0" err="1">
-                <a:solidFill>
-                  <a:schemeClr val="tx1"/>
-                </a:solidFill>
-              </a:rPr>
-              <a:t>We</a:t>
-            </a:r>
-            <a:r>
-              <a:rPr lang="it-IT" dirty="0">
-                <a:solidFill>
-                  <a:schemeClr val="tx1"/>
-                </a:solidFill>
-              </a:rPr>
-              <a:t> </a:t>
-            </a:r>
-            <a:r>
-              <a:rPr lang="it-IT" dirty="0" err="1">
-                <a:solidFill>
-                  <a:schemeClr val="tx1"/>
-                </a:solidFill>
-              </a:rPr>
-              <a:t>have</a:t>
-            </a:r>
-            <a:r>
-              <a:rPr lang="it-IT" dirty="0">
-                <a:solidFill>
-                  <a:schemeClr val="tx1"/>
-                </a:solidFill>
-              </a:rPr>
-              <a:t> </a:t>
-            </a:r>
-            <a:r>
-              <a:rPr lang="it-IT" dirty="0" err="1">
-                <a:solidFill>
-                  <a:schemeClr val="tx1"/>
-                </a:solidFill>
-              </a:rPr>
-              <a:t>evaluated</a:t>
-            </a:r>
-            <a:r>
-              <a:rPr lang="it-IT" dirty="0">
-                <a:solidFill>
-                  <a:schemeClr val="tx1"/>
-                </a:solidFill>
-              </a:rPr>
-              <a:t> </a:t>
-            </a:r>
-            <a:r>
-              <a:rPr lang="it-IT" dirty="0" err="1">
-                <a:solidFill>
-                  <a:schemeClr val="tx1"/>
-                </a:solidFill>
-              </a:rPr>
-              <a:t>our</a:t>
-            </a:r>
-            <a:r>
-              <a:rPr lang="it-IT" dirty="0">
-                <a:solidFill>
-                  <a:schemeClr val="tx1"/>
-                </a:solidFill>
-              </a:rPr>
-              <a:t> </a:t>
-            </a:r>
-            <a:r>
-              <a:rPr lang="it-IT" dirty="0" err="1">
-                <a:solidFill>
-                  <a:schemeClr val="tx1"/>
-                </a:solidFill>
-              </a:rPr>
-              <a:t>implementation</a:t>
-            </a:r>
-            <a:r>
-              <a:rPr lang="it-IT" dirty="0">
-                <a:solidFill>
-                  <a:schemeClr val="tx1"/>
-                </a:solidFill>
-              </a:rPr>
-              <a:t> of the CAHD </a:t>
-            </a:r>
-            <a:r>
-              <a:rPr lang="it-IT" dirty="0" err="1">
-                <a:solidFill>
-                  <a:schemeClr val="tx1"/>
-                </a:solidFill>
-              </a:rPr>
-              <a:t>algorithm</a:t>
-            </a:r>
-            <a:r>
-              <a:rPr lang="it-IT" dirty="0">
-                <a:solidFill>
-                  <a:schemeClr val="tx1"/>
-                </a:solidFill>
-              </a:rPr>
-              <a:t> with </a:t>
-            </a:r>
-            <a:r>
-              <a:rPr lang="it-IT" dirty="0" err="1">
-                <a:solidFill>
-                  <a:schemeClr val="tx1"/>
-                </a:solidFill>
-              </a:rPr>
-              <a:t>two</a:t>
-            </a:r>
-            <a:r>
-              <a:rPr lang="it-IT" dirty="0">
-                <a:solidFill>
-                  <a:schemeClr val="tx1"/>
-                </a:solidFill>
-              </a:rPr>
-              <a:t> </a:t>
-            </a:r>
-            <a:r>
-              <a:rPr lang="it-IT" dirty="0" err="1">
-                <a:solidFill>
-                  <a:schemeClr val="tx1"/>
-                </a:solidFill>
-              </a:rPr>
-              <a:t>differents</a:t>
-            </a:r>
-            <a:r>
-              <a:rPr lang="it-IT" dirty="0">
-                <a:solidFill>
-                  <a:schemeClr val="tx1"/>
-                </a:solidFill>
-              </a:rPr>
-              <a:t> datasets, </a:t>
-            </a:r>
-            <a:r>
-              <a:rPr lang="en-US" dirty="0">
-                <a:solidFill>
-                  <a:schemeClr val="tx1"/>
-                </a:solidFill>
-              </a:rPr>
-              <a:t>BMSWebView1 (BMS1) and BMSWebView2 (BMS2), using a thousand items.</a:t>
-            </a:r>
+            <a:endParaRPr lang="it-IT" dirty="0">
+              <a:solidFill>
+                <a:schemeClr val="tx1"/>
+              </a:solidFill>
+            </a:endParaRPr>
           </a:p>
           <a:p>
             <a:pPr>
@@ -16134,12 +17482,140 @@
               </a:lnSpc>
             </a:pPr>
             <a:r>
+              <a:rPr lang="it-IT" dirty="0" err="1">
+                <a:solidFill>
+                  <a:schemeClr val="tx1"/>
+                </a:solidFill>
+              </a:rPr>
+              <a:t>We</a:t>
+            </a:r>
+            <a:r>
+              <a:rPr lang="it-IT" dirty="0">
+                <a:solidFill>
+                  <a:schemeClr val="tx1"/>
+                </a:solidFill>
+              </a:rPr>
+              <a:t> </a:t>
+            </a:r>
+            <a:r>
+              <a:rPr lang="it-IT" dirty="0" err="1">
+                <a:solidFill>
+                  <a:schemeClr val="tx1"/>
+                </a:solidFill>
+              </a:rPr>
+              <a:t>have</a:t>
+            </a:r>
+            <a:r>
+              <a:rPr lang="it-IT" dirty="0">
+                <a:solidFill>
+                  <a:schemeClr val="tx1"/>
+                </a:solidFill>
+              </a:rPr>
+              <a:t> </a:t>
+            </a:r>
+            <a:r>
+              <a:rPr lang="it-IT" dirty="0" err="1">
+                <a:solidFill>
+                  <a:schemeClr val="tx1"/>
+                </a:solidFill>
+              </a:rPr>
+              <a:t>evaluated</a:t>
+            </a:r>
+            <a:r>
+              <a:rPr lang="it-IT" dirty="0">
+                <a:solidFill>
+                  <a:schemeClr val="tx1"/>
+                </a:solidFill>
+              </a:rPr>
+              <a:t> </a:t>
+            </a:r>
+            <a:r>
+              <a:rPr lang="it-IT" dirty="0" err="1">
+                <a:solidFill>
+                  <a:schemeClr val="tx1"/>
+                </a:solidFill>
+              </a:rPr>
+              <a:t>our</a:t>
+            </a:r>
+            <a:r>
+              <a:rPr lang="it-IT" dirty="0">
+                <a:solidFill>
+                  <a:schemeClr val="tx1"/>
+                </a:solidFill>
+              </a:rPr>
+              <a:t> </a:t>
+            </a:r>
+            <a:r>
+              <a:rPr lang="it-IT" dirty="0" err="1">
+                <a:solidFill>
+                  <a:schemeClr val="tx1"/>
+                </a:solidFill>
+              </a:rPr>
+              <a:t>implementation</a:t>
+            </a:r>
+            <a:r>
+              <a:rPr lang="it-IT" dirty="0">
+                <a:solidFill>
+                  <a:schemeClr val="tx1"/>
+                </a:solidFill>
+              </a:rPr>
+              <a:t> of the CAHD </a:t>
+            </a:r>
+            <a:r>
+              <a:rPr lang="it-IT" dirty="0" err="1">
+                <a:solidFill>
+                  <a:schemeClr val="tx1"/>
+                </a:solidFill>
+              </a:rPr>
+              <a:t>algorithm</a:t>
+            </a:r>
+            <a:r>
+              <a:rPr lang="it-IT" dirty="0">
+                <a:solidFill>
+                  <a:schemeClr val="tx1"/>
+                </a:solidFill>
+              </a:rPr>
+              <a:t> with </a:t>
+            </a:r>
+            <a:r>
+              <a:rPr lang="it-IT" dirty="0" err="1">
+                <a:solidFill>
+                  <a:schemeClr val="tx1"/>
+                </a:solidFill>
+              </a:rPr>
+              <a:t>two</a:t>
+            </a:r>
+            <a:r>
+              <a:rPr lang="it-IT" dirty="0">
+                <a:solidFill>
+                  <a:schemeClr val="tx1"/>
+                </a:solidFill>
+              </a:rPr>
+              <a:t> </a:t>
+            </a:r>
+            <a:r>
+              <a:rPr lang="it-IT" dirty="0" err="1">
+                <a:solidFill>
+                  <a:schemeClr val="tx1"/>
+                </a:solidFill>
+              </a:rPr>
+              <a:t>differents</a:t>
+            </a:r>
+            <a:r>
+              <a:rPr lang="it-IT" dirty="0">
+                <a:solidFill>
+                  <a:schemeClr val="tx1"/>
+                </a:solidFill>
+              </a:rPr>
+              <a:t> datasets, </a:t>
+            </a:r>
+            <a:r>
               <a:rPr lang="en-US" dirty="0">
                 <a:solidFill>
                   <a:schemeClr val="tx1"/>
                 </a:solidFill>
               </a:rPr>
-              <a:t>We have organized the data as a band matrix, so that consecutive rows are likely to share a large number of common items. Band matrix organization has been acknowledged as a beneficial mode to represent sparse data in various scientific applications.</a:t>
+              <a:t>BMSWebView1 (BMS1) and BMSWebView2 (BMS2), using a thousand items.</a:t>
             </a:r>
           </a:p>
           <a:p>
@@ -16148,11 +17624,14 @@
                 <a:spcPct val="110000"/>
               </a:lnSpc>
             </a:pPr>
-            <a:endParaRPr lang="en-US" dirty="0">
-              <a:solidFill>
-                <a:schemeClr val="tx1"/>
-              </a:solidFill>
-            </a:endParaRPr>
+            <a:r>
+              <a:rPr lang="en-US" dirty="0">
+                <a:solidFill>
+                  <a:schemeClr val="tx1"/>
+                </a:solidFill>
+              </a:rPr>
+              <a:t>We have organized the data as a band matrix, so that consecutive rows are likely to share a large number of common items. Band matrix organization has been acknowledged as a beneficial mode to represent sparse data in various scientific applications.</a:t>
+            </a:r>
           </a:p>
           <a:p>
             <a:pPr>
@@ -16289,8 +17768,8 @@
         </p:blipFill>
         <p:spPr>
           <a:xfrm>
-            <a:off x="361610" y="1875840"/>
-            <a:ext cx="5521325" cy="4121737"/>
+            <a:off x="355258" y="1875840"/>
+            <a:ext cx="5486400" cy="4114800"/>
           </a:xfrm>
         </p:spPr>
       </p:pic>
@@ -16317,7 +17796,7 @@
         <p:spPr>
           <a:xfrm>
             <a:off x="6309067" y="1875840"/>
-            <a:ext cx="5527675" cy="4126478"/>
+            <a:ext cx="5486400" cy="4114800"/>
           </a:xfrm>
           <a:prstGeom prst="rect">
             <a:avLst/>
@@ -17168,15 +18647,6 @@
 </file>
 
 <file path=customXml/item1.xml><?xml version="1.0" encoding="utf-8"?>
-<?mso-contentType ?>
-<FormTemplates xmlns="http://schemas.microsoft.com/sharepoint/v3/contenttype/forms">
-  <Display>DocumentLibraryForm</Display>
-  <Edit>DocumentLibraryForm</Edit>
-  <New>DocumentLibraryForm</New>
-</FormTemplates>
-</file>
-
-<file path=customXml/item2.xml><?xml version="1.0" encoding="utf-8"?>
 <ct:contentTypeSchema xmlns:ct="http://schemas.microsoft.com/office/2006/metadata/contentType" xmlns:ma="http://schemas.microsoft.com/office/2006/metadata/properties/metaAttributes" ct:_="" ma:_="" ma:contentTypeName="Document" ma:contentTypeID="0x01010079F111ED35F8CC479449609E8A0923A6" ma:contentTypeVersion="12" ma:contentTypeDescription="Create a new document." ma:contentTypeScope="" ma:versionID="426e97fa315356fffbdcd9876fe988c2">
   <xsd:schema xmlns:xsd="http://www.w3.org/2001/XMLSchema" xmlns:xs="http://www.w3.org/2001/XMLSchema" xmlns:p="http://schemas.microsoft.com/office/2006/metadata/properties" xmlns:ns2="71af3243-3dd4-4a8d-8c0d-dd76da1f02a5" xmlns:ns3="16c05727-aa75-4e4a-9b5f-8a80a1165891" targetNamespace="http://schemas.microsoft.com/office/2006/metadata/properties" ma:root="true" ma:fieldsID="14b8f0def80e6d70ce3def20c90759ae" ns2:_="" ns3:_="">
     <xsd:import namespace="71af3243-3dd4-4a8d-8c0d-dd76da1f02a5"/>
@@ -17397,6 +18867,15 @@
 </ct:contentTypeSchema>
 </file>
 
+<file path=customXml/item2.xml><?xml version="1.0" encoding="utf-8"?>
+<?mso-contentType ?>
+<FormTemplates xmlns="http://schemas.microsoft.com/sharepoint/v3/contenttype/forms">
+  <Display>DocumentLibraryForm</Display>
+  <Edit>DocumentLibraryForm</Edit>
+  <New>DocumentLibraryForm</New>
+</FormTemplates>
+</file>
+
 <file path=customXml/item3.xml><?xml version="1.0" encoding="utf-8"?>
 <p:properties xmlns:p="http://schemas.microsoft.com/office/2006/metadata/properties" xmlns:xsi="http://www.w3.org/2001/XMLSchema-instance" xmlns:pc="http://schemas.microsoft.com/office/infopath/2007/PartnerControls">
   <documentManagement>
@@ -17407,14 +18886,6 @@
 </file>
 
 <file path=customXml/itemProps1.xml><?xml version="1.0" encoding="utf-8"?>
-<ds:datastoreItem xmlns:ds="http://schemas.openxmlformats.org/officeDocument/2006/customXml" ds:itemID="{3C8E00D1-8EA3-4E42-801D-0253E1EAFC21}">
-  <ds:schemaRefs>
-    <ds:schemaRef ds:uri="http://schemas.microsoft.com/sharepoint/v3/contenttype/forms"/>
-  </ds:schemaRefs>
-</ds:datastoreItem>
-</file>
-
-<file path=customXml/itemProps2.xml><?xml version="1.0" encoding="utf-8"?>
 <ds:datastoreItem xmlns:ds="http://schemas.openxmlformats.org/officeDocument/2006/customXml" ds:itemID="{ABC329F5-30EE-4BF7-AA2A-B837B51416B4}">
   <ds:schemaRefs>
     <ds:schemaRef ds:uri="http://schemas.microsoft.com/office/2006/metadata/contentType"/>
@@ -17433,6 +18904,14 @@
 </ds:datastoreItem>
 </file>
 
+<file path=customXml/itemProps2.xml><?xml version="1.0" encoding="utf-8"?>
+<ds:datastoreItem xmlns:ds="http://schemas.openxmlformats.org/officeDocument/2006/customXml" ds:itemID="{3C8E00D1-8EA3-4E42-801D-0253E1EAFC21}">
+  <ds:schemaRefs>
+    <ds:schemaRef ds:uri="http://schemas.microsoft.com/sharepoint/v3/contenttype/forms"/>
+  </ds:schemaRefs>
+</ds:datastoreItem>
+</file>
+
 <file path=customXml/itemProps3.xml><?xml version="1.0" encoding="utf-8"?>
 <ds:datastoreItem xmlns:ds="http://schemas.openxmlformats.org/officeDocument/2006/customXml" ds:itemID="{99919F73-B6C2-4A43-95E2-833EC48925FE}">
   <ds:schemaRefs>

</xml_diff>